<commit_message>
Complete draft of monetizing instructions
</commit_message>
<xml_diff>
--- a/project-rumble/figures/etsa02_figures.pptx
+++ b/project-rumble/figures/etsa02_figures.pptx
@@ -7,15 +7,14 @@
   <p:sldIdLst>
     <p:sldId id="256" r:id="rId2"/>
     <p:sldId id="258" r:id="rId3"/>
-    <p:sldId id="264" r:id="rId4"/>
-    <p:sldId id="268" r:id="rId5"/>
-    <p:sldId id="263" r:id="rId6"/>
-    <p:sldId id="259" r:id="rId7"/>
-    <p:sldId id="260" r:id="rId8"/>
-    <p:sldId id="261" r:id="rId9"/>
-    <p:sldId id="265" r:id="rId10"/>
-    <p:sldId id="267" r:id="rId11"/>
-    <p:sldId id="262" r:id="rId12"/>
+    <p:sldId id="268" r:id="rId4"/>
+    <p:sldId id="263" r:id="rId5"/>
+    <p:sldId id="259" r:id="rId6"/>
+    <p:sldId id="260" r:id="rId7"/>
+    <p:sldId id="261" r:id="rId8"/>
+    <p:sldId id="265" r:id="rId9"/>
+    <p:sldId id="267" r:id="rId10"/>
+    <p:sldId id="262" r:id="rId11"/>
   </p:sldIdLst>
   <p:sldSz cx="12192000" cy="6858000"/>
   <p:notesSz cx="6858000" cy="9144000"/>
@@ -121,7 +120,6 @@
           <p14:sldIdLst>
             <p14:sldId id="256"/>
             <p14:sldId id="258"/>
-            <p14:sldId id="264"/>
             <p14:sldId id="268"/>
             <p14:sldId id="263"/>
             <p14:sldId id="259"/>
@@ -25987,303 +25985,6 @@
       </p:grpSpPr>
       <p:sp>
         <p:nvSpPr>
-          <p:cNvPr id="5" name="Oval 4">
-            <a:extLst>
-              <a:ext uri="{FF2B5EF4-FFF2-40B4-BE49-F238E27FC236}">
-                <a16:creationId xmlns="" xmlns:a16="http://schemas.microsoft.com/office/drawing/2014/main" id="{1BE905D4-A72F-472F-85B9-E5262CB9A9BA}"/>
-              </a:ext>
-            </a:extLst>
-          </p:cNvPr>
-          <p:cNvSpPr/>
-          <p:nvPr/>
-        </p:nvSpPr>
-        <p:spPr>
-          <a:xfrm>
-            <a:off x="2923413" y="717756"/>
-            <a:ext cx="3598606" cy="3429000"/>
-          </a:xfrm>
-          <a:prstGeom prst="ellipse">
-            <a:avLst/>
-          </a:prstGeom>
-          <a:noFill/>
-          <a:ln w="38100">
-            <a:noFill/>
-          </a:ln>
-        </p:spPr>
-        <p:style>
-          <a:lnRef idx="2">
-            <a:schemeClr val="accent1">
-              <a:shade val="50000"/>
-            </a:schemeClr>
-          </a:lnRef>
-          <a:fillRef idx="1">
-            <a:schemeClr val="accent1"/>
-          </a:fillRef>
-          <a:effectRef idx="0">
-            <a:schemeClr val="accent1"/>
-          </a:effectRef>
-          <a:fontRef idx="minor">
-            <a:schemeClr val="lt1"/>
-          </a:fontRef>
-        </p:style>
-        <p:txBody>
-          <a:bodyPr rtlCol="0" anchor="ctr"/>
-          <a:lstStyle/>
-          <a:p>
-            <a:pPr algn="ctr"/>
-            <a:endParaRPr lang="en-US"/>
-          </a:p>
-        </p:txBody>
-      </p:sp>
-      <p:sp>
-        <p:nvSpPr>
-          <p:cNvPr id="6" name="Oval 5">
-            <a:extLst>
-              <a:ext uri="{FF2B5EF4-FFF2-40B4-BE49-F238E27FC236}">
-                <a16:creationId xmlns="" xmlns:a16="http://schemas.microsoft.com/office/drawing/2014/main" id="{DA8FA223-F814-41D8-8A8C-99F6794FF949}"/>
-              </a:ext>
-            </a:extLst>
-          </p:cNvPr>
-          <p:cNvSpPr/>
-          <p:nvPr/>
-        </p:nvSpPr>
-        <p:spPr>
-          <a:xfrm>
-            <a:off x="4301613" y="3092246"/>
-            <a:ext cx="3598606" cy="3429000"/>
-          </a:xfrm>
-          <a:prstGeom prst="ellipse">
-            <a:avLst/>
-          </a:prstGeom>
-          <a:noFill/>
-          <a:ln w="38100">
-            <a:noFill/>
-          </a:ln>
-        </p:spPr>
-        <p:style>
-          <a:lnRef idx="2">
-            <a:schemeClr val="accent1">
-              <a:shade val="50000"/>
-            </a:schemeClr>
-          </a:lnRef>
-          <a:fillRef idx="1">
-            <a:schemeClr val="accent1"/>
-          </a:fillRef>
-          <a:effectRef idx="0">
-            <a:schemeClr val="accent1"/>
-          </a:effectRef>
-          <a:fontRef idx="minor">
-            <a:schemeClr val="lt1"/>
-          </a:fontRef>
-        </p:style>
-        <p:txBody>
-          <a:bodyPr rtlCol="0" anchor="ctr"/>
-          <a:lstStyle/>
-          <a:p>
-            <a:pPr algn="ctr"/>
-            <a:endParaRPr lang="en-US"/>
-          </a:p>
-        </p:txBody>
-      </p:sp>
-      <p:sp>
-        <p:nvSpPr>
-          <p:cNvPr id="7" name="Oval 6">
-            <a:extLst>
-              <a:ext uri="{FF2B5EF4-FFF2-40B4-BE49-F238E27FC236}">
-                <a16:creationId xmlns="" xmlns:a16="http://schemas.microsoft.com/office/drawing/2014/main" id="{2C06C390-1650-43A9-92CD-878AF82A2EDE}"/>
-              </a:ext>
-            </a:extLst>
-          </p:cNvPr>
-          <p:cNvSpPr/>
-          <p:nvPr/>
-        </p:nvSpPr>
-        <p:spPr>
-          <a:xfrm>
-            <a:off x="5656779" y="717756"/>
-            <a:ext cx="3598606" cy="3429000"/>
-          </a:xfrm>
-          <a:prstGeom prst="ellipse">
-            <a:avLst/>
-          </a:prstGeom>
-          <a:noFill/>
-          <a:ln w="38100">
-            <a:noFill/>
-          </a:ln>
-        </p:spPr>
-        <p:style>
-          <a:lnRef idx="2">
-            <a:schemeClr val="accent1">
-              <a:shade val="50000"/>
-            </a:schemeClr>
-          </a:lnRef>
-          <a:fillRef idx="1">
-            <a:schemeClr val="accent1"/>
-          </a:fillRef>
-          <a:effectRef idx="0">
-            <a:schemeClr val="accent1"/>
-          </a:effectRef>
-          <a:fontRef idx="minor">
-            <a:schemeClr val="lt1"/>
-          </a:fontRef>
-        </p:style>
-        <p:txBody>
-          <a:bodyPr rtlCol="0" anchor="ctr"/>
-          <a:lstStyle/>
-          <a:p>
-            <a:pPr algn="ctr"/>
-            <a:endParaRPr lang="en-US"/>
-          </a:p>
-        </p:txBody>
-      </p:sp>
-      <p:sp>
-        <p:nvSpPr>
-          <p:cNvPr id="8" name="Rectangle 7">
-            <a:extLst>
-              <a:ext uri="{FF2B5EF4-FFF2-40B4-BE49-F238E27FC236}">
-                <a16:creationId xmlns="" xmlns:a16="http://schemas.microsoft.com/office/drawing/2014/main" id="{42BB545C-B9B2-4B88-A085-D7573212A8A6}"/>
-              </a:ext>
-            </a:extLst>
-          </p:cNvPr>
-          <p:cNvSpPr/>
-          <p:nvPr/>
-        </p:nvSpPr>
-        <p:spPr>
-          <a:xfrm>
-            <a:off x="6914421" y="1909036"/>
-            <a:ext cx="1925528" cy="523220"/>
-          </a:xfrm>
-          <a:prstGeom prst="rect">
-            <a:avLst/>
-          </a:prstGeom>
-        </p:spPr>
-        <p:txBody>
-          <a:bodyPr wrap="none">
-            <a:spAutoFit/>
-          </a:bodyPr>
-          <a:lstStyle/>
-          <a:p>
-            <a:pPr algn="ctr"/>
-            <a:r>
-              <a:rPr lang="sv-SE" sz="2800" dirty="0" err="1">
-                <a:latin typeface="Arial" panose="020B0604020202020204" pitchFamily="34" charset="0"/>
-                <a:cs typeface="Arial" panose="020B0604020202020204" pitchFamily="34" charset="0"/>
-              </a:rPr>
-              <a:t>Monetizing</a:t>
-            </a:r>
-            <a:endParaRPr lang="en-US" dirty="0"/>
-          </a:p>
-        </p:txBody>
-      </p:sp>
-      <p:sp>
-        <p:nvSpPr>
-          <p:cNvPr id="9" name="Rectangle 8">
-            <a:extLst>
-              <a:ext uri="{FF2B5EF4-FFF2-40B4-BE49-F238E27FC236}">
-                <a16:creationId xmlns="" xmlns:a16="http://schemas.microsoft.com/office/drawing/2014/main" id="{822A8BCF-BF7A-45F3-AEB2-2A8B87E5DD2B}"/>
-              </a:ext>
-            </a:extLst>
-          </p:cNvPr>
-          <p:cNvSpPr/>
-          <p:nvPr/>
-        </p:nvSpPr>
-        <p:spPr>
-          <a:xfrm>
-            <a:off x="3225245" y="1909036"/>
-            <a:ext cx="2106667" cy="523220"/>
-          </a:xfrm>
-          <a:prstGeom prst="rect">
-            <a:avLst/>
-          </a:prstGeom>
-        </p:spPr>
-        <p:txBody>
-          <a:bodyPr wrap="none">
-            <a:spAutoFit/>
-          </a:bodyPr>
-          <a:lstStyle/>
-          <a:p>
-            <a:pPr algn="ctr"/>
-            <a:r>
-              <a:rPr lang="sv-SE" sz="2800" dirty="0">
-                <a:latin typeface="Arial" panose="020B0604020202020204" pitchFamily="34" charset="0"/>
-                <a:cs typeface="Arial" panose="020B0604020202020204" pitchFamily="34" charset="0"/>
-              </a:rPr>
-              <a:t>Engineering</a:t>
-            </a:r>
-            <a:endParaRPr lang="en-US" dirty="0"/>
-          </a:p>
-        </p:txBody>
-      </p:sp>
-      <p:sp>
-        <p:nvSpPr>
-          <p:cNvPr id="10" name="Rectangle 9">
-            <a:extLst>
-              <a:ext uri="{FF2B5EF4-FFF2-40B4-BE49-F238E27FC236}">
-                <a16:creationId xmlns="" xmlns:a16="http://schemas.microsoft.com/office/drawing/2014/main" id="{37CDA193-5920-4DBA-9F62-8C8CE4AE6FFB}"/>
-              </a:ext>
-            </a:extLst>
-          </p:cNvPr>
-          <p:cNvSpPr/>
-          <p:nvPr/>
-        </p:nvSpPr>
-        <p:spPr>
-          <a:xfrm>
-            <a:off x="5083383" y="4716587"/>
-            <a:ext cx="2084225" cy="523220"/>
-          </a:xfrm>
-          <a:prstGeom prst="rect">
-            <a:avLst/>
-          </a:prstGeom>
-        </p:spPr>
-        <p:txBody>
-          <a:bodyPr wrap="none">
-            <a:spAutoFit/>
-          </a:bodyPr>
-          <a:lstStyle/>
-          <a:p>
-            <a:pPr algn="ctr"/>
-            <a:r>
-              <a:rPr lang="sv-SE" sz="2800" dirty="0" err="1">
-                <a:latin typeface="Arial" panose="020B0604020202020204" pitchFamily="34" charset="0"/>
-                <a:cs typeface="Arial" panose="020B0604020202020204" pitchFamily="34" charset="0"/>
-              </a:rPr>
-              <a:t>Strategizing</a:t>
-            </a:r>
-            <a:endParaRPr lang="en-US" dirty="0"/>
-          </a:p>
-        </p:txBody>
-      </p:sp>
-    </p:spTree>
-    <p:extLst>
-      <p:ext uri="{BB962C8B-B14F-4D97-AF65-F5344CB8AC3E}">
-        <p14:creationId xmlns:p14="http://schemas.microsoft.com/office/powerpoint/2010/main" val="314093017"/>
-      </p:ext>
-    </p:extLst>
-  </p:cSld>
-  <p:clrMapOvr>
-    <a:masterClrMapping/>
-  </p:clrMapOvr>
-</p:sld>
-</file>
-
-<file path=ppt/slides/slide11.xml><?xml version="1.0" encoding="utf-8"?>
-<p:sld xmlns:a="http://schemas.openxmlformats.org/drawingml/2006/main" xmlns:r="http://schemas.openxmlformats.org/officeDocument/2006/relationships" xmlns:p="http://schemas.openxmlformats.org/presentationml/2006/main">
-  <p:cSld>
-    <p:spTree>
-      <p:nvGrpSpPr>
-        <p:cNvPr id="1" name=""/>
-        <p:cNvGrpSpPr/>
-        <p:nvPr/>
-      </p:nvGrpSpPr>
-      <p:grpSpPr>
-        <a:xfrm>
-          <a:off x="0" y="0"/>
-          <a:ext cx="0" cy="0"/>
-          <a:chOff x="0" y="0"/>
-          <a:chExt cx="0" cy="0"/>
-        </a:xfrm>
-      </p:grpSpPr>
-      <p:sp>
-        <p:nvSpPr>
           <p:cNvPr id="2" name="Title 1"/>
           <p:cNvSpPr>
             <a:spLocks noGrp="1"/>
@@ -28797,8 +28498,8 @@
         </p:nvSpPr>
         <p:spPr>
           <a:xfrm>
-            <a:off x="2357738" y="2238312"/>
-            <a:ext cx="569387" cy="369332"/>
+            <a:off x="2185208" y="1962264"/>
+            <a:ext cx="1031051" cy="646331"/>
           </a:xfrm>
           <a:prstGeom prst="rect">
             <a:avLst/>
@@ -28815,9 +28516,29 @@
                 <a:latin typeface="Arial" panose="020B0604020202020204" pitchFamily="34" charset="0"/>
                 <a:cs typeface="Arial" panose="020B0604020202020204" pitchFamily="34" charset="0"/>
               </a:rPr>
-              <a:t>€20</a:t>
+              <a:t>€</a:t>
+            </a:r>
+            <a:r>
+              <a:rPr lang="sv-SE" dirty="0" smtClean="0">
+                <a:latin typeface="Arial" panose="020B0604020202020204" pitchFamily="34" charset="0"/>
+                <a:cs typeface="Arial" panose="020B0604020202020204" pitchFamily="34" charset="0"/>
+              </a:rPr>
+              <a:t>20</a:t>
             </a:r>
             <a:endParaRPr lang="en-US" dirty="0"/>
+          </a:p>
+          <a:p>
+            <a:r>
+              <a:rPr lang="en-US" dirty="0" smtClean="0">
+                <a:latin typeface="Arial" panose="020B0604020202020204" pitchFamily="34" charset="0"/>
+                <a:cs typeface="Arial" panose="020B0604020202020204" pitchFamily="34" charset="0"/>
+              </a:rPr>
+              <a:t>€38 (2x)</a:t>
+            </a:r>
+            <a:endParaRPr lang="sv-SE" dirty="0" smtClean="0">
+              <a:latin typeface="Arial" panose="020B0604020202020204" pitchFamily="34" charset="0"/>
+              <a:cs typeface="Arial" panose="020B0604020202020204" pitchFamily="34" charset="0"/>
+            </a:endParaRPr>
           </a:p>
         </p:txBody>
       </p:sp>
@@ -30197,12 +29918,23 @@
           <a:lstStyle/>
           <a:p>
             <a:r>
-              <a:rPr lang="sv-SE" dirty="0">
+              <a:rPr lang="sv-SE" b="1" dirty="0">
                 <a:latin typeface="Arial" panose="020B0604020202020204" pitchFamily="34" charset="0"/>
                 <a:cs typeface="Arial" panose="020B0604020202020204" pitchFamily="34" charset="0"/>
               </a:rPr>
-              <a:t>Robot D</a:t>
+              <a:t>Robot </a:t>
             </a:r>
+            <a:r>
+              <a:rPr lang="sv-SE" b="1" dirty="0" smtClean="0">
+                <a:latin typeface="Arial" panose="020B0604020202020204" pitchFamily="34" charset="0"/>
+                <a:cs typeface="Arial" panose="020B0604020202020204" pitchFamily="34" charset="0"/>
+              </a:rPr>
+              <a:t>C</a:t>
+            </a:r>
+            <a:endParaRPr lang="sv-SE" b="1" dirty="0">
+              <a:latin typeface="Arial" panose="020B0604020202020204" pitchFamily="34" charset="0"/>
+              <a:cs typeface="Arial" panose="020B0604020202020204" pitchFamily="34" charset="0"/>
+            </a:endParaRPr>
           </a:p>
           <a:p>
             <a:r>
@@ -30220,7 +29952,14 @@
                 <a:latin typeface="Arial" panose="020B0604020202020204" pitchFamily="34" charset="0"/>
                 <a:cs typeface="Arial" panose="020B0604020202020204" pitchFamily="34" charset="0"/>
               </a:rPr>
-              <a:t>= €95</a:t>
+              <a:t>= €</a:t>
+            </a:r>
+            <a:r>
+              <a:rPr lang="sv-SE" dirty="0" smtClean="0">
+                <a:latin typeface="Arial" panose="020B0604020202020204" pitchFamily="34" charset="0"/>
+                <a:cs typeface="Arial" panose="020B0604020202020204" pitchFamily="34" charset="0"/>
+              </a:rPr>
+              <a:t>93</a:t>
             </a:r>
             <a:endParaRPr lang="en-US" dirty="0"/>
           </a:p>
@@ -30241,7 +29980,7 @@
         <p:spPr>
           <a:xfrm>
             <a:off x="6119822" y="4831274"/>
-            <a:ext cx="1959191" cy="1200329"/>
+            <a:ext cx="2053767" cy="1477328"/>
           </a:xfrm>
           <a:prstGeom prst="rect">
             <a:avLst/>
@@ -30254,57 +29993,45 @@
           <a:lstStyle/>
           <a:p>
             <a:r>
+              <a:rPr lang="sv-SE" b="1" dirty="0" smtClean="0">
+                <a:latin typeface="Arial" panose="020B0604020202020204" pitchFamily="34" charset="0"/>
+                <a:cs typeface="Arial" panose="020B0604020202020204" pitchFamily="34" charset="0"/>
+              </a:rPr>
+              <a:t>Robot B</a:t>
+            </a:r>
+          </a:p>
+          <a:p>
+            <a:r>
+              <a:rPr lang="sv-SE" dirty="0" smtClean="0">
+                <a:latin typeface="Arial" panose="020B0604020202020204" pitchFamily="34" charset="0"/>
+                <a:cs typeface="Arial" panose="020B0604020202020204" pitchFamily="34" charset="0"/>
+              </a:rPr>
+              <a:t>2x Robot B</a:t>
+            </a:r>
+          </a:p>
+          <a:p>
+            <a:r>
               <a:rPr lang="sv-SE" dirty="0">
+                <a:latin typeface="Arial" panose="020B0604020202020204" pitchFamily="34" charset="0"/>
+                <a:cs typeface="Arial" panose="020B0604020202020204" pitchFamily="34" charset="0"/>
+              </a:rPr>
+              <a:t>Basic Leader Bot</a:t>
+            </a:r>
+          </a:p>
+          <a:p>
+            <a:r>
+              <a:rPr lang="sv-SE" dirty="0" smtClean="0">
                 <a:latin typeface="Arial" panose="020B0604020202020204" pitchFamily="34" charset="0"/>
                 <a:cs typeface="Arial" panose="020B0604020202020204" pitchFamily="34" charset="0"/>
               </a:rPr>
               <a:t>Basic </a:t>
             </a:r>
             <a:r>
-              <a:rPr lang="sv-SE" dirty="0" err="1">
-                <a:latin typeface="Arial" panose="020B0604020202020204" pitchFamily="34" charset="0"/>
-                <a:cs typeface="Arial" panose="020B0604020202020204" pitchFamily="34" charset="0"/>
-              </a:rPr>
-              <a:t>Leader</a:t>
-            </a:r>
-            <a:r>
               <a:rPr lang="sv-SE" dirty="0">
                 <a:latin typeface="Arial" panose="020B0604020202020204" pitchFamily="34" charset="0"/>
                 <a:cs typeface="Arial" panose="020B0604020202020204" pitchFamily="34" charset="0"/>
               </a:rPr>
-              <a:t> Bot</a:t>
-            </a:r>
-          </a:p>
-          <a:p>
-            <a:r>
-              <a:rPr lang="sv-SE" dirty="0">
-                <a:latin typeface="Arial" panose="020B0604020202020204" pitchFamily="34" charset="0"/>
-                <a:cs typeface="Arial" panose="020B0604020202020204" pitchFamily="34" charset="0"/>
-              </a:rPr>
-              <a:t>3x Robot B</a:t>
-            </a:r>
-          </a:p>
-          <a:p>
-            <a:r>
-              <a:rPr lang="sv-SE" dirty="0">
-                <a:latin typeface="Arial" panose="020B0604020202020204" pitchFamily="34" charset="0"/>
-                <a:cs typeface="Arial" panose="020B0604020202020204" pitchFamily="34" charset="0"/>
-              </a:rPr>
-              <a:t>Basic </a:t>
-            </a:r>
-            <a:r>
-              <a:rPr lang="sv-SE" dirty="0" err="1">
-                <a:latin typeface="Arial" panose="020B0604020202020204" pitchFamily="34" charset="0"/>
-                <a:cs typeface="Arial" panose="020B0604020202020204" pitchFamily="34" charset="0"/>
-              </a:rPr>
-              <a:t>Melee</a:t>
-            </a:r>
-            <a:r>
-              <a:rPr lang="sv-SE" dirty="0">
-                <a:latin typeface="Arial" panose="020B0604020202020204" pitchFamily="34" charset="0"/>
-                <a:cs typeface="Arial" panose="020B0604020202020204" pitchFamily="34" charset="0"/>
-              </a:rPr>
-              <a:t> Bot</a:t>
+              <a:t>Melee Bot</a:t>
             </a:r>
           </a:p>
           <a:p>
@@ -30314,7 +30041,14 @@
                 <a:latin typeface="Arial" panose="020B0604020202020204" pitchFamily="34" charset="0"/>
                 <a:cs typeface="Arial" panose="020B0604020202020204" pitchFamily="34" charset="0"/>
               </a:rPr>
-              <a:t>= €95</a:t>
+              <a:t>= €</a:t>
+            </a:r>
+            <a:r>
+              <a:rPr lang="sv-SE" dirty="0" smtClean="0">
+                <a:latin typeface="Arial" panose="020B0604020202020204" pitchFamily="34" charset="0"/>
+                <a:cs typeface="Arial" panose="020B0604020202020204" pitchFamily="34" charset="0"/>
+              </a:rPr>
+              <a:t>93</a:t>
             </a:r>
             <a:endParaRPr lang="en-US" dirty="0"/>
           </a:p>
@@ -30689,7 +30423,7 @@
         <p:spPr>
           <a:xfrm>
             <a:off x="1626330" y="5274371"/>
-            <a:ext cx="1082348" cy="369332"/>
+            <a:ext cx="1146468" cy="369332"/>
           </a:xfrm>
           <a:prstGeom prst="rect">
             <a:avLst/>
@@ -30702,13 +30436,13 @@
           <a:lstStyle/>
           <a:p>
             <a:r>
-              <a:rPr lang="sv-SE" dirty="0" err="1">
+              <a:rPr lang="sv-SE" b="1" dirty="0" err="1">
                 <a:latin typeface="Arial" panose="020B0604020202020204" pitchFamily="34" charset="0"/>
                 <a:cs typeface="Arial" panose="020B0604020202020204" pitchFamily="34" charset="0"/>
               </a:rPr>
               <a:t>Bespoke</a:t>
             </a:r>
-            <a:endParaRPr lang="en-US" dirty="0"/>
+            <a:endParaRPr lang="en-US" b="1" dirty="0"/>
           </a:p>
         </p:txBody>
       </p:sp>
@@ -30805,7 +30539,7 @@
     </p:spTree>
     <p:extLst>
       <p:ext uri="{BB962C8B-B14F-4D97-AF65-F5344CB8AC3E}">
-        <p14:creationId xmlns:p14="http://schemas.microsoft.com/office/powerpoint/2010/main" val="1146937526"/>
+        <p14:creationId xmlns:p14="http://schemas.microsoft.com/office/powerpoint/2010/main" val="3343880895"/>
       </p:ext>
     </p:extLst>
   </p:cSld>
@@ -30816,2390 +30550,6 @@
 </file>
 
 <file path=ppt/slides/slide4.xml><?xml version="1.0" encoding="utf-8"?>
-<p:sld xmlns:a="http://schemas.openxmlformats.org/drawingml/2006/main" xmlns:r="http://schemas.openxmlformats.org/officeDocument/2006/relationships" xmlns:p="http://schemas.openxmlformats.org/presentationml/2006/main">
-  <p:cSld>
-    <p:spTree>
-      <p:nvGrpSpPr>
-        <p:cNvPr id="1" name=""/>
-        <p:cNvGrpSpPr/>
-        <p:nvPr/>
-      </p:nvGrpSpPr>
-      <p:grpSpPr>
-        <a:xfrm>
-          <a:off x="0" y="0"/>
-          <a:ext cx="0" cy="0"/>
-          <a:chOff x="0" y="0"/>
-          <a:chExt cx="0" cy="0"/>
-        </a:xfrm>
-      </p:grpSpPr>
-      <p:sp>
-        <p:nvSpPr>
-          <p:cNvPr id="4" name="Cloud 3">
-            <a:extLst>
-              <a:ext uri="{FF2B5EF4-FFF2-40B4-BE49-F238E27FC236}">
-                <a16:creationId xmlns="" xmlns:a16="http://schemas.microsoft.com/office/drawing/2014/main" id="{3141B1FA-0C65-4790-B026-C4DF262B0BD7}"/>
-              </a:ext>
-            </a:extLst>
-          </p:cNvPr>
-          <p:cNvSpPr/>
-          <p:nvPr/>
-        </p:nvSpPr>
-        <p:spPr>
-          <a:xfrm>
-            <a:off x="78658" y="285137"/>
-            <a:ext cx="9910916" cy="4119716"/>
-          </a:xfrm>
-          <a:prstGeom prst="cloud">
-            <a:avLst/>
-          </a:prstGeom>
-          <a:noFill/>
-          <a:ln>
-            <a:solidFill>
-              <a:schemeClr val="tx1"/>
-            </a:solidFill>
-          </a:ln>
-        </p:spPr>
-        <p:style>
-          <a:lnRef idx="2">
-            <a:schemeClr val="accent1">
-              <a:shade val="50000"/>
-            </a:schemeClr>
-          </a:lnRef>
-          <a:fillRef idx="1">
-            <a:schemeClr val="accent1"/>
-          </a:fillRef>
-          <a:effectRef idx="0">
-            <a:schemeClr val="accent1"/>
-          </a:effectRef>
-          <a:fontRef idx="minor">
-            <a:schemeClr val="lt1"/>
-          </a:fontRef>
-        </p:style>
-        <p:txBody>
-          <a:bodyPr rtlCol="0" anchor="ctr"/>
-          <a:lstStyle/>
-          <a:p>
-            <a:pPr algn="ctr"/>
-            <a:r>
-              <a:rPr lang="sv-SE" sz="2800" dirty="0">
-                <a:solidFill>
-                  <a:schemeClr val="tx1"/>
-                </a:solidFill>
-                <a:latin typeface="Arial" panose="020B0604020202020204" pitchFamily="34" charset="0"/>
-                <a:cs typeface="Arial" panose="020B0604020202020204" pitchFamily="34" charset="0"/>
-              </a:rPr>
-              <a:t>Robot Market</a:t>
-            </a:r>
-          </a:p>
-          <a:p>
-            <a:pPr algn="ctr"/>
-            <a:endParaRPr lang="sv-SE" sz="2800" dirty="0">
-              <a:solidFill>
-                <a:schemeClr val="tx1"/>
-              </a:solidFill>
-              <a:latin typeface="Arial" panose="020B0604020202020204" pitchFamily="34" charset="0"/>
-              <a:cs typeface="Arial" panose="020B0604020202020204" pitchFamily="34" charset="0"/>
-            </a:endParaRPr>
-          </a:p>
-          <a:p>
-            <a:pPr algn="ctr"/>
-            <a:endParaRPr lang="sv-SE" sz="2800" dirty="0">
-              <a:solidFill>
-                <a:schemeClr val="tx1"/>
-              </a:solidFill>
-              <a:latin typeface="Arial" panose="020B0604020202020204" pitchFamily="34" charset="0"/>
-              <a:cs typeface="Arial" panose="020B0604020202020204" pitchFamily="34" charset="0"/>
-            </a:endParaRPr>
-          </a:p>
-          <a:p>
-            <a:pPr algn="ctr"/>
-            <a:endParaRPr lang="sv-SE" sz="2800" dirty="0">
-              <a:solidFill>
-                <a:schemeClr val="tx1"/>
-              </a:solidFill>
-              <a:latin typeface="Arial" panose="020B0604020202020204" pitchFamily="34" charset="0"/>
-              <a:cs typeface="Arial" panose="020B0604020202020204" pitchFamily="34" charset="0"/>
-            </a:endParaRPr>
-          </a:p>
-          <a:p>
-            <a:pPr algn="ctr"/>
-            <a:endParaRPr lang="sv-SE" sz="2800" dirty="0">
-              <a:solidFill>
-                <a:schemeClr val="tx1"/>
-              </a:solidFill>
-              <a:latin typeface="Arial" panose="020B0604020202020204" pitchFamily="34" charset="0"/>
-              <a:cs typeface="Arial" panose="020B0604020202020204" pitchFamily="34" charset="0"/>
-            </a:endParaRPr>
-          </a:p>
-          <a:p>
-            <a:pPr algn="ctr"/>
-            <a:endParaRPr lang="en-US" sz="2800" dirty="0">
-              <a:solidFill>
-                <a:schemeClr val="tx1"/>
-              </a:solidFill>
-              <a:latin typeface="Arial" panose="020B0604020202020204" pitchFamily="34" charset="0"/>
-              <a:cs typeface="Arial" panose="020B0604020202020204" pitchFamily="34" charset="0"/>
-            </a:endParaRPr>
-          </a:p>
-        </p:txBody>
-      </p:sp>
-      <p:sp>
-        <p:nvSpPr>
-          <p:cNvPr id="12" name="Rectangle 11">
-            <a:extLst>
-              <a:ext uri="{FF2B5EF4-FFF2-40B4-BE49-F238E27FC236}">
-                <a16:creationId xmlns="" xmlns:a16="http://schemas.microsoft.com/office/drawing/2014/main" id="{1F37C778-DFF2-4C39-9755-E6BF0C148F35}"/>
-              </a:ext>
-            </a:extLst>
-          </p:cNvPr>
-          <p:cNvSpPr/>
-          <p:nvPr/>
-        </p:nvSpPr>
-        <p:spPr>
-          <a:xfrm>
-            <a:off x="1100336" y="2821837"/>
-            <a:ext cx="1005468" cy="369332"/>
-          </a:xfrm>
-          <a:prstGeom prst="rect">
-            <a:avLst/>
-          </a:prstGeom>
-        </p:spPr>
-        <p:txBody>
-          <a:bodyPr wrap="none">
-            <a:spAutoFit/>
-          </a:bodyPr>
-          <a:lstStyle/>
-          <a:p>
-            <a:r>
-              <a:rPr lang="sv-SE" dirty="0">
-                <a:latin typeface="Arial" panose="020B0604020202020204" pitchFamily="34" charset="0"/>
-                <a:cs typeface="Arial" panose="020B0604020202020204" pitchFamily="34" charset="0"/>
-              </a:rPr>
-              <a:t>Robot A</a:t>
-            </a:r>
-            <a:endParaRPr lang="en-US" dirty="0"/>
-          </a:p>
-        </p:txBody>
-      </p:sp>
-      <p:sp>
-        <p:nvSpPr>
-          <p:cNvPr id="13" name="Rectangle 12">
-            <a:extLst>
-              <a:ext uri="{FF2B5EF4-FFF2-40B4-BE49-F238E27FC236}">
-                <a16:creationId xmlns="" xmlns:a16="http://schemas.microsoft.com/office/drawing/2014/main" id="{AD3DE133-097E-4D53-90A0-BDE00462AE50}"/>
-              </a:ext>
-            </a:extLst>
-          </p:cNvPr>
-          <p:cNvSpPr/>
-          <p:nvPr/>
-        </p:nvSpPr>
-        <p:spPr>
-          <a:xfrm>
-            <a:off x="2131268" y="3302104"/>
-            <a:ext cx="1018227" cy="369332"/>
-          </a:xfrm>
-          <a:prstGeom prst="rect">
-            <a:avLst/>
-          </a:prstGeom>
-        </p:spPr>
-        <p:txBody>
-          <a:bodyPr wrap="none">
-            <a:spAutoFit/>
-          </a:bodyPr>
-          <a:lstStyle/>
-          <a:p>
-            <a:r>
-              <a:rPr lang="sv-SE" dirty="0">
-                <a:latin typeface="Arial" panose="020B0604020202020204" pitchFamily="34" charset="0"/>
-                <a:cs typeface="Arial" panose="020B0604020202020204" pitchFamily="34" charset="0"/>
-              </a:rPr>
-              <a:t>Robot B</a:t>
-            </a:r>
-            <a:endParaRPr lang="en-US" dirty="0"/>
-          </a:p>
-        </p:txBody>
-      </p:sp>
-      <p:sp>
-        <p:nvSpPr>
-          <p:cNvPr id="14" name="Rectangle 13">
-            <a:extLst>
-              <a:ext uri="{FF2B5EF4-FFF2-40B4-BE49-F238E27FC236}">
-                <a16:creationId xmlns="" xmlns:a16="http://schemas.microsoft.com/office/drawing/2014/main" id="{92D4F564-9B8A-41F2-8344-AD34196FAFEF}"/>
-              </a:ext>
-            </a:extLst>
-          </p:cNvPr>
-          <p:cNvSpPr/>
-          <p:nvPr/>
-        </p:nvSpPr>
-        <p:spPr>
-          <a:xfrm>
-            <a:off x="3322308" y="2748535"/>
-            <a:ext cx="1031051" cy="369332"/>
-          </a:xfrm>
-          <a:prstGeom prst="rect">
-            <a:avLst/>
-          </a:prstGeom>
-        </p:spPr>
-        <p:txBody>
-          <a:bodyPr wrap="none">
-            <a:spAutoFit/>
-          </a:bodyPr>
-          <a:lstStyle/>
-          <a:p>
-            <a:r>
-              <a:rPr lang="sv-SE" dirty="0">
-                <a:latin typeface="Arial" panose="020B0604020202020204" pitchFamily="34" charset="0"/>
-                <a:cs typeface="Arial" panose="020B0604020202020204" pitchFamily="34" charset="0"/>
-              </a:rPr>
-              <a:t>Robot C</a:t>
-            </a:r>
-            <a:endParaRPr lang="en-US" dirty="0"/>
-          </a:p>
-        </p:txBody>
-      </p:sp>
-      <p:sp>
-        <p:nvSpPr>
-          <p:cNvPr id="15" name="Rectangle 14">
-            <a:extLst>
-              <a:ext uri="{FF2B5EF4-FFF2-40B4-BE49-F238E27FC236}">
-                <a16:creationId xmlns="" xmlns:a16="http://schemas.microsoft.com/office/drawing/2014/main" id="{1116CA10-F054-4AF7-812F-2E14C3DB92A8}"/>
-              </a:ext>
-            </a:extLst>
-          </p:cNvPr>
-          <p:cNvSpPr/>
-          <p:nvPr/>
-        </p:nvSpPr>
-        <p:spPr>
-          <a:xfrm>
-            <a:off x="4581462" y="2724948"/>
-            <a:ext cx="1031051" cy="369332"/>
-          </a:xfrm>
-          <a:prstGeom prst="rect">
-            <a:avLst/>
-          </a:prstGeom>
-        </p:spPr>
-        <p:txBody>
-          <a:bodyPr wrap="none">
-            <a:spAutoFit/>
-          </a:bodyPr>
-          <a:lstStyle/>
-          <a:p>
-            <a:r>
-              <a:rPr lang="sv-SE" dirty="0">
-                <a:latin typeface="Arial" panose="020B0604020202020204" pitchFamily="34" charset="0"/>
-                <a:cs typeface="Arial" panose="020B0604020202020204" pitchFamily="34" charset="0"/>
-              </a:rPr>
-              <a:t>Robot D</a:t>
-            </a:r>
-            <a:endParaRPr lang="en-US" dirty="0"/>
-          </a:p>
-        </p:txBody>
-      </p:sp>
-      <p:sp>
-        <p:nvSpPr>
-          <p:cNvPr id="16" name="Rectangle 15">
-            <a:extLst>
-              <a:ext uri="{FF2B5EF4-FFF2-40B4-BE49-F238E27FC236}">
-                <a16:creationId xmlns="" xmlns:a16="http://schemas.microsoft.com/office/drawing/2014/main" id="{63714086-3485-4087-A683-F1C203CF3F3A}"/>
-              </a:ext>
-            </a:extLst>
-          </p:cNvPr>
-          <p:cNvSpPr/>
-          <p:nvPr/>
-        </p:nvSpPr>
-        <p:spPr>
-          <a:xfrm>
-            <a:off x="1301325" y="1834009"/>
-            <a:ext cx="569387" cy="369332"/>
-          </a:xfrm>
-          <a:prstGeom prst="rect">
-            <a:avLst/>
-          </a:prstGeom>
-        </p:spPr>
-        <p:txBody>
-          <a:bodyPr wrap="none">
-            <a:spAutoFit/>
-          </a:bodyPr>
-          <a:lstStyle/>
-          <a:p>
-            <a:r>
-              <a:rPr lang="sv-SE" dirty="0">
-                <a:latin typeface="Arial" panose="020B0604020202020204" pitchFamily="34" charset="0"/>
-                <a:cs typeface="Arial" panose="020B0604020202020204" pitchFamily="34" charset="0"/>
-              </a:rPr>
-              <a:t>€40</a:t>
-            </a:r>
-            <a:endParaRPr lang="en-US" dirty="0"/>
-          </a:p>
-        </p:txBody>
-      </p:sp>
-      <p:sp>
-        <p:nvSpPr>
-          <p:cNvPr id="17" name="Rectangle 16">
-            <a:extLst>
-              <a:ext uri="{FF2B5EF4-FFF2-40B4-BE49-F238E27FC236}">
-                <a16:creationId xmlns="" xmlns:a16="http://schemas.microsoft.com/office/drawing/2014/main" id="{A871A22D-3138-4F20-953F-81B2D34BC353}"/>
-              </a:ext>
-            </a:extLst>
-          </p:cNvPr>
-          <p:cNvSpPr/>
-          <p:nvPr/>
-        </p:nvSpPr>
-        <p:spPr>
-          <a:xfrm>
-            <a:off x="2185208" y="1962264"/>
-            <a:ext cx="1031051" cy="646331"/>
-          </a:xfrm>
-          <a:prstGeom prst="rect">
-            <a:avLst/>
-          </a:prstGeom>
-        </p:spPr>
-        <p:txBody>
-          <a:bodyPr wrap="none">
-            <a:spAutoFit/>
-          </a:bodyPr>
-          <a:lstStyle/>
-          <a:p>
-            <a:r>
-              <a:rPr lang="sv-SE" dirty="0">
-                <a:latin typeface="Arial" panose="020B0604020202020204" pitchFamily="34" charset="0"/>
-                <a:cs typeface="Arial" panose="020B0604020202020204" pitchFamily="34" charset="0"/>
-              </a:rPr>
-              <a:t>€</a:t>
-            </a:r>
-            <a:r>
-              <a:rPr lang="sv-SE" dirty="0" smtClean="0">
-                <a:latin typeface="Arial" panose="020B0604020202020204" pitchFamily="34" charset="0"/>
-                <a:cs typeface="Arial" panose="020B0604020202020204" pitchFamily="34" charset="0"/>
-              </a:rPr>
-              <a:t>20</a:t>
-            </a:r>
-            <a:endParaRPr lang="en-US" dirty="0"/>
-          </a:p>
-          <a:p>
-            <a:r>
-              <a:rPr lang="en-US" dirty="0" smtClean="0">
-                <a:latin typeface="Arial" panose="020B0604020202020204" pitchFamily="34" charset="0"/>
-                <a:cs typeface="Arial" panose="020B0604020202020204" pitchFamily="34" charset="0"/>
-              </a:rPr>
-              <a:t>€38 (2x)</a:t>
-            </a:r>
-            <a:endParaRPr lang="sv-SE" dirty="0" smtClean="0">
-              <a:latin typeface="Arial" panose="020B0604020202020204" pitchFamily="34" charset="0"/>
-              <a:cs typeface="Arial" panose="020B0604020202020204" pitchFamily="34" charset="0"/>
-            </a:endParaRPr>
-          </a:p>
-        </p:txBody>
-      </p:sp>
-      <p:sp>
-        <p:nvSpPr>
-          <p:cNvPr id="18" name="Rectangle 17">
-            <a:extLst>
-              <a:ext uri="{FF2B5EF4-FFF2-40B4-BE49-F238E27FC236}">
-                <a16:creationId xmlns="" xmlns:a16="http://schemas.microsoft.com/office/drawing/2014/main" id="{35D06240-088C-41F7-9749-83216E384825}"/>
-              </a:ext>
-            </a:extLst>
-          </p:cNvPr>
-          <p:cNvSpPr/>
-          <p:nvPr/>
-        </p:nvSpPr>
-        <p:spPr>
-          <a:xfrm>
-            <a:off x="3549744" y="1795901"/>
-            <a:ext cx="569387" cy="369332"/>
-          </a:xfrm>
-          <a:prstGeom prst="rect">
-            <a:avLst/>
-          </a:prstGeom>
-        </p:spPr>
-        <p:txBody>
-          <a:bodyPr wrap="none">
-            <a:spAutoFit/>
-          </a:bodyPr>
-          <a:lstStyle/>
-          <a:p>
-            <a:r>
-              <a:rPr lang="sv-SE" dirty="0">
-                <a:latin typeface="Arial" panose="020B0604020202020204" pitchFamily="34" charset="0"/>
-                <a:cs typeface="Arial" panose="020B0604020202020204" pitchFamily="34" charset="0"/>
-              </a:rPr>
-              <a:t>€55</a:t>
-            </a:r>
-            <a:endParaRPr lang="en-US" dirty="0"/>
-          </a:p>
-        </p:txBody>
-      </p:sp>
-      <p:sp>
-        <p:nvSpPr>
-          <p:cNvPr id="19" name="Rectangle 18">
-            <a:extLst>
-              <a:ext uri="{FF2B5EF4-FFF2-40B4-BE49-F238E27FC236}">
-                <a16:creationId xmlns="" xmlns:a16="http://schemas.microsoft.com/office/drawing/2014/main" id="{507C15F6-17F8-4344-860D-324D4C1B2851}"/>
-              </a:ext>
-            </a:extLst>
-          </p:cNvPr>
-          <p:cNvSpPr/>
-          <p:nvPr/>
-        </p:nvSpPr>
-        <p:spPr>
-          <a:xfrm>
-            <a:off x="4812293" y="1769119"/>
-            <a:ext cx="569387" cy="369332"/>
-          </a:xfrm>
-          <a:prstGeom prst="rect">
-            <a:avLst/>
-          </a:prstGeom>
-        </p:spPr>
-        <p:txBody>
-          <a:bodyPr wrap="none">
-            <a:spAutoFit/>
-          </a:bodyPr>
-          <a:lstStyle/>
-          <a:p>
-            <a:r>
-              <a:rPr lang="sv-SE" dirty="0">
-                <a:latin typeface="Arial" panose="020B0604020202020204" pitchFamily="34" charset="0"/>
-                <a:cs typeface="Arial" panose="020B0604020202020204" pitchFamily="34" charset="0"/>
-              </a:rPr>
-              <a:t>€30</a:t>
-            </a:r>
-            <a:endParaRPr lang="en-US" dirty="0"/>
-          </a:p>
-        </p:txBody>
-      </p:sp>
-      <p:sp>
-        <p:nvSpPr>
-          <p:cNvPr id="20" name="Rectangle 19">
-            <a:extLst>
-              <a:ext uri="{FF2B5EF4-FFF2-40B4-BE49-F238E27FC236}">
-                <a16:creationId xmlns="" xmlns:a16="http://schemas.microsoft.com/office/drawing/2014/main" id="{C08A1ED6-5BE5-4CF2-BA4F-0BF592BA9433}"/>
-              </a:ext>
-            </a:extLst>
-          </p:cNvPr>
-          <p:cNvSpPr/>
-          <p:nvPr/>
-        </p:nvSpPr>
-        <p:spPr>
-          <a:xfrm>
-            <a:off x="4317861" y="4988154"/>
-            <a:ext cx="1031116" cy="369332"/>
-          </a:xfrm>
-          <a:prstGeom prst="rect">
-            <a:avLst/>
-          </a:prstGeom>
-        </p:spPr>
-        <p:txBody>
-          <a:bodyPr wrap="none">
-            <a:spAutoFit/>
-          </a:bodyPr>
-          <a:lstStyle/>
-          <a:p>
-            <a:r>
-              <a:rPr lang="sv-SE" u="sng" dirty="0">
-                <a:latin typeface="Arial" panose="020B0604020202020204" pitchFamily="34" charset="0"/>
-                <a:cs typeface="Arial" panose="020B0604020202020204" pitchFamily="34" charset="0"/>
-              </a:rPr>
-              <a:t>Group A</a:t>
-            </a:r>
-            <a:endParaRPr lang="en-US" u="sng" dirty="0"/>
-          </a:p>
-        </p:txBody>
-      </p:sp>
-      <p:sp>
-        <p:nvSpPr>
-          <p:cNvPr id="21" name="Rectangle 20">
-            <a:extLst>
-              <a:ext uri="{FF2B5EF4-FFF2-40B4-BE49-F238E27FC236}">
-                <a16:creationId xmlns="" xmlns:a16="http://schemas.microsoft.com/office/drawing/2014/main" id="{2CB84429-4C8B-4D28-B92A-683A872D3EF0}"/>
-              </a:ext>
-            </a:extLst>
-          </p:cNvPr>
-          <p:cNvSpPr/>
-          <p:nvPr/>
-        </p:nvSpPr>
-        <p:spPr>
-          <a:xfrm>
-            <a:off x="6099994" y="4552218"/>
-            <a:ext cx="1056700" cy="369332"/>
-          </a:xfrm>
-          <a:prstGeom prst="rect">
-            <a:avLst/>
-          </a:prstGeom>
-        </p:spPr>
-        <p:txBody>
-          <a:bodyPr wrap="none">
-            <a:spAutoFit/>
-          </a:bodyPr>
-          <a:lstStyle/>
-          <a:p>
-            <a:r>
-              <a:rPr lang="sv-SE" u="sng" dirty="0">
-                <a:latin typeface="Arial" panose="020B0604020202020204" pitchFamily="34" charset="0"/>
-                <a:cs typeface="Arial" panose="020B0604020202020204" pitchFamily="34" charset="0"/>
-              </a:rPr>
-              <a:t>Group C</a:t>
-            </a:r>
-            <a:endParaRPr lang="en-US" u="sng" dirty="0"/>
-          </a:p>
-        </p:txBody>
-      </p:sp>
-      <p:cxnSp>
-        <p:nvCxnSpPr>
-          <p:cNvPr id="23" name="Straight Arrow Connector 22">
-            <a:extLst>
-              <a:ext uri="{FF2B5EF4-FFF2-40B4-BE49-F238E27FC236}">
-                <a16:creationId xmlns="" xmlns:a16="http://schemas.microsoft.com/office/drawing/2014/main" id="{CF5BE959-978C-48AF-8508-DE76B7326356}"/>
-              </a:ext>
-            </a:extLst>
-          </p:cNvPr>
-          <p:cNvCxnSpPr>
-            <a:cxnSpLocks/>
-            <a:stCxn id="20" idx="0"/>
-            <a:endCxn id="13" idx="2"/>
-          </p:cNvCxnSpPr>
-          <p:nvPr/>
-        </p:nvCxnSpPr>
-        <p:spPr>
-          <a:xfrm flipH="1" flipV="1">
-            <a:off x="2640382" y="3671436"/>
-            <a:ext cx="2193037" cy="1316718"/>
-          </a:xfrm>
-          <a:prstGeom prst="straightConnector1">
-            <a:avLst/>
-          </a:prstGeom>
-          <a:ln w="38100">
-            <a:solidFill>
-              <a:schemeClr val="tx1"/>
-            </a:solidFill>
-            <a:prstDash val="dash"/>
-            <a:tailEnd type="triangle"/>
-          </a:ln>
-        </p:spPr>
-        <p:style>
-          <a:lnRef idx="1">
-            <a:schemeClr val="accent1"/>
-          </a:lnRef>
-          <a:fillRef idx="0">
-            <a:schemeClr val="accent1"/>
-          </a:fillRef>
-          <a:effectRef idx="0">
-            <a:schemeClr val="accent1"/>
-          </a:effectRef>
-          <a:fontRef idx="minor">
-            <a:schemeClr val="tx1"/>
-          </a:fontRef>
-        </p:style>
-      </p:cxnSp>
-      <p:cxnSp>
-        <p:nvCxnSpPr>
-          <p:cNvPr id="24" name="Straight Arrow Connector 23">
-            <a:extLst>
-              <a:ext uri="{FF2B5EF4-FFF2-40B4-BE49-F238E27FC236}">
-                <a16:creationId xmlns="" xmlns:a16="http://schemas.microsoft.com/office/drawing/2014/main" id="{EA94AA31-2348-488D-AF95-C5BD4CD8C3FC}"/>
-              </a:ext>
-            </a:extLst>
-          </p:cNvPr>
-          <p:cNvCxnSpPr>
-            <a:cxnSpLocks/>
-          </p:cNvCxnSpPr>
-          <p:nvPr/>
-        </p:nvCxnSpPr>
-        <p:spPr>
-          <a:xfrm flipH="1" flipV="1">
-            <a:off x="3920340" y="3094280"/>
-            <a:ext cx="1044946" cy="1893874"/>
-          </a:xfrm>
-          <a:prstGeom prst="straightConnector1">
-            <a:avLst/>
-          </a:prstGeom>
-          <a:ln w="38100">
-            <a:solidFill>
-              <a:schemeClr val="tx1"/>
-            </a:solidFill>
-            <a:tailEnd type="triangle"/>
-          </a:ln>
-        </p:spPr>
-        <p:style>
-          <a:lnRef idx="1">
-            <a:schemeClr val="accent1"/>
-          </a:lnRef>
-          <a:fillRef idx="0">
-            <a:schemeClr val="accent1"/>
-          </a:fillRef>
-          <a:effectRef idx="0">
-            <a:schemeClr val="accent1"/>
-          </a:effectRef>
-          <a:fontRef idx="minor">
-            <a:schemeClr val="tx1"/>
-          </a:fontRef>
-        </p:style>
-      </p:cxnSp>
-      <p:sp>
-        <p:nvSpPr>
-          <p:cNvPr id="28" name="Rectangle 27">
-            <a:extLst>
-              <a:ext uri="{FF2B5EF4-FFF2-40B4-BE49-F238E27FC236}">
-                <a16:creationId xmlns="" xmlns:a16="http://schemas.microsoft.com/office/drawing/2014/main" id="{FF0E0202-04C0-41BA-AD7D-C64268A08F36}"/>
-              </a:ext>
-            </a:extLst>
-          </p:cNvPr>
-          <p:cNvSpPr/>
-          <p:nvPr/>
-        </p:nvSpPr>
-        <p:spPr>
-          <a:xfrm>
-            <a:off x="3483983" y="4367552"/>
-            <a:ext cx="428322" cy="369332"/>
-          </a:xfrm>
-          <a:prstGeom prst="rect">
-            <a:avLst/>
-          </a:prstGeom>
-        </p:spPr>
-        <p:txBody>
-          <a:bodyPr wrap="none">
-            <a:spAutoFit/>
-          </a:bodyPr>
-          <a:lstStyle/>
-          <a:p>
-            <a:r>
-              <a:rPr lang="sv-SE" dirty="0">
-                <a:latin typeface="Arial" panose="020B0604020202020204" pitchFamily="34" charset="0"/>
-                <a:cs typeface="Arial" panose="020B0604020202020204" pitchFamily="34" charset="0"/>
-              </a:rPr>
-              <a:t>2x</a:t>
-            </a:r>
-            <a:endParaRPr lang="en-US" dirty="0"/>
-          </a:p>
-        </p:txBody>
-      </p:sp>
-      <p:cxnSp>
-        <p:nvCxnSpPr>
-          <p:cNvPr id="29" name="Straight Arrow Connector 28">
-            <a:extLst>
-              <a:ext uri="{FF2B5EF4-FFF2-40B4-BE49-F238E27FC236}">
-                <a16:creationId xmlns="" xmlns:a16="http://schemas.microsoft.com/office/drawing/2014/main" id="{AE1D563C-18F7-40C4-8C12-89E6F334705F}"/>
-              </a:ext>
-            </a:extLst>
-          </p:cNvPr>
-          <p:cNvCxnSpPr>
-            <a:cxnSpLocks/>
-          </p:cNvCxnSpPr>
-          <p:nvPr/>
-        </p:nvCxnSpPr>
-        <p:spPr>
-          <a:xfrm flipH="1" flipV="1">
-            <a:off x="3149495" y="3151369"/>
-            <a:ext cx="3455078" cy="1415561"/>
-          </a:xfrm>
-          <a:prstGeom prst="straightConnector1">
-            <a:avLst/>
-          </a:prstGeom>
-          <a:ln w="38100">
-            <a:solidFill>
-              <a:schemeClr val="tx1"/>
-            </a:solidFill>
-            <a:prstDash val="dash"/>
-            <a:tailEnd type="triangle"/>
-          </a:ln>
-        </p:spPr>
-        <p:style>
-          <a:lnRef idx="1">
-            <a:schemeClr val="accent1"/>
-          </a:lnRef>
-          <a:fillRef idx="0">
-            <a:schemeClr val="accent1"/>
-          </a:fillRef>
-          <a:effectRef idx="0">
-            <a:schemeClr val="accent1"/>
-          </a:effectRef>
-          <a:fontRef idx="minor">
-            <a:schemeClr val="tx1"/>
-          </a:fontRef>
-        </p:style>
-      </p:cxnSp>
-      <p:sp>
-        <p:nvSpPr>
-          <p:cNvPr id="30" name="Rectangle 29">
-            <a:extLst>
-              <a:ext uri="{FF2B5EF4-FFF2-40B4-BE49-F238E27FC236}">
-                <a16:creationId xmlns="" xmlns:a16="http://schemas.microsoft.com/office/drawing/2014/main" id="{2AB490D3-2200-47DD-88EE-2B6DB3DFE0E5}"/>
-              </a:ext>
-            </a:extLst>
-          </p:cNvPr>
-          <p:cNvSpPr/>
-          <p:nvPr/>
-        </p:nvSpPr>
-        <p:spPr>
-          <a:xfrm>
-            <a:off x="3537308" y="2200270"/>
-            <a:ext cx="589707" cy="548265"/>
-          </a:xfrm>
-          <a:prstGeom prst="rect">
-            <a:avLst/>
-          </a:prstGeom>
-          <a:noFill/>
-          <a:ln>
-            <a:solidFill>
-              <a:schemeClr val="tx1"/>
-            </a:solidFill>
-          </a:ln>
-        </p:spPr>
-        <p:style>
-          <a:lnRef idx="2">
-            <a:schemeClr val="accent1">
-              <a:shade val="50000"/>
-            </a:schemeClr>
-          </a:lnRef>
-          <a:fillRef idx="1">
-            <a:schemeClr val="accent1"/>
-          </a:fillRef>
-          <a:effectRef idx="0">
-            <a:schemeClr val="accent1"/>
-          </a:effectRef>
-          <a:fontRef idx="minor">
-            <a:schemeClr val="lt1"/>
-          </a:fontRef>
-        </p:style>
-        <p:txBody>
-          <a:bodyPr rtlCol="0" anchor="ctr"/>
-          <a:lstStyle/>
-          <a:p>
-            <a:pPr algn="ctr"/>
-            <a:endParaRPr lang="en-US"/>
-          </a:p>
-        </p:txBody>
-      </p:sp>
-      <p:sp>
-        <p:nvSpPr>
-          <p:cNvPr id="31" name="Rectangle 30">
-            <a:extLst>
-              <a:ext uri="{FF2B5EF4-FFF2-40B4-BE49-F238E27FC236}">
-                <a16:creationId xmlns="" xmlns:a16="http://schemas.microsoft.com/office/drawing/2014/main" id="{A5AC5AEE-9CA9-4FBA-ABF1-040C70742F85}"/>
-              </a:ext>
-            </a:extLst>
-          </p:cNvPr>
-          <p:cNvSpPr/>
-          <p:nvPr/>
-        </p:nvSpPr>
-        <p:spPr>
-          <a:xfrm>
-            <a:off x="1272965" y="2207848"/>
-            <a:ext cx="589707" cy="548265"/>
-          </a:xfrm>
-          <a:prstGeom prst="rect">
-            <a:avLst/>
-          </a:prstGeom>
-          <a:noFill/>
-          <a:ln>
-            <a:solidFill>
-              <a:schemeClr val="tx1"/>
-            </a:solidFill>
-          </a:ln>
-        </p:spPr>
-        <p:style>
-          <a:lnRef idx="2">
-            <a:schemeClr val="accent1">
-              <a:shade val="50000"/>
-            </a:schemeClr>
-          </a:lnRef>
-          <a:fillRef idx="1">
-            <a:schemeClr val="accent1"/>
-          </a:fillRef>
-          <a:effectRef idx="0">
-            <a:schemeClr val="accent1"/>
-          </a:effectRef>
-          <a:fontRef idx="minor">
-            <a:schemeClr val="lt1"/>
-          </a:fontRef>
-        </p:style>
-        <p:txBody>
-          <a:bodyPr rtlCol="0" anchor="ctr"/>
-          <a:lstStyle/>
-          <a:p>
-            <a:pPr algn="ctr"/>
-            <a:endParaRPr lang="en-US"/>
-          </a:p>
-        </p:txBody>
-      </p:sp>
-      <p:sp>
-        <p:nvSpPr>
-          <p:cNvPr id="32" name="Oval 31">
-            <a:extLst>
-              <a:ext uri="{FF2B5EF4-FFF2-40B4-BE49-F238E27FC236}">
-                <a16:creationId xmlns="" xmlns:a16="http://schemas.microsoft.com/office/drawing/2014/main" id="{E3D788FF-545E-49BE-812A-B835E474F58E}"/>
-              </a:ext>
-            </a:extLst>
-          </p:cNvPr>
-          <p:cNvSpPr/>
-          <p:nvPr/>
-        </p:nvSpPr>
-        <p:spPr>
-          <a:xfrm>
-            <a:off x="4782447" y="2128967"/>
-            <a:ext cx="608889" cy="595981"/>
-          </a:xfrm>
-          <a:prstGeom prst="ellipse">
-            <a:avLst/>
-          </a:prstGeom>
-          <a:noFill/>
-          <a:ln>
-            <a:solidFill>
-              <a:schemeClr val="tx1"/>
-            </a:solidFill>
-          </a:ln>
-        </p:spPr>
-        <p:style>
-          <a:lnRef idx="2">
-            <a:schemeClr val="accent1">
-              <a:shade val="50000"/>
-            </a:schemeClr>
-          </a:lnRef>
-          <a:fillRef idx="1">
-            <a:schemeClr val="accent1"/>
-          </a:fillRef>
-          <a:effectRef idx="0">
-            <a:schemeClr val="accent1"/>
-          </a:effectRef>
-          <a:fontRef idx="minor">
-            <a:schemeClr val="lt1"/>
-          </a:fontRef>
-        </p:style>
-        <p:txBody>
-          <a:bodyPr rtlCol="0" anchor="ctr"/>
-          <a:lstStyle/>
-          <a:p>
-            <a:pPr algn="ctr"/>
-            <a:endParaRPr lang="en-US"/>
-          </a:p>
-        </p:txBody>
-      </p:sp>
-      <p:sp>
-        <p:nvSpPr>
-          <p:cNvPr id="33" name="Isosceles Triangle 32">
-            <a:extLst>
-              <a:ext uri="{FF2B5EF4-FFF2-40B4-BE49-F238E27FC236}">
-                <a16:creationId xmlns="" xmlns:a16="http://schemas.microsoft.com/office/drawing/2014/main" id="{3293596F-27FE-47F0-B885-CC2AE68D7DCA}"/>
-              </a:ext>
-            </a:extLst>
-          </p:cNvPr>
-          <p:cNvSpPr/>
-          <p:nvPr/>
-        </p:nvSpPr>
-        <p:spPr>
-          <a:xfrm>
-            <a:off x="2315070" y="2640380"/>
-            <a:ext cx="660938" cy="584783"/>
-          </a:xfrm>
-          <a:prstGeom prst="triangle">
-            <a:avLst/>
-          </a:prstGeom>
-          <a:noFill/>
-          <a:ln>
-            <a:solidFill>
-              <a:schemeClr val="tx1"/>
-            </a:solidFill>
-          </a:ln>
-        </p:spPr>
-        <p:style>
-          <a:lnRef idx="2">
-            <a:schemeClr val="accent1">
-              <a:shade val="50000"/>
-            </a:schemeClr>
-          </a:lnRef>
-          <a:fillRef idx="1">
-            <a:schemeClr val="accent1"/>
-          </a:fillRef>
-          <a:effectRef idx="0">
-            <a:schemeClr val="accent1"/>
-          </a:effectRef>
-          <a:fontRef idx="minor">
-            <a:schemeClr val="lt1"/>
-          </a:fontRef>
-        </p:style>
-        <p:txBody>
-          <a:bodyPr rtlCol="0" anchor="ctr"/>
-          <a:lstStyle/>
-          <a:p>
-            <a:pPr algn="ctr"/>
-            <a:endParaRPr lang="en-US"/>
-          </a:p>
-        </p:txBody>
-      </p:sp>
-      <p:sp>
-        <p:nvSpPr>
-          <p:cNvPr id="35" name="Rectangle 34">
-            <a:extLst>
-              <a:ext uri="{FF2B5EF4-FFF2-40B4-BE49-F238E27FC236}">
-                <a16:creationId xmlns="" xmlns:a16="http://schemas.microsoft.com/office/drawing/2014/main" id="{879F8447-5CD1-4C24-A2B0-C99C2D7F227E}"/>
-              </a:ext>
-            </a:extLst>
-          </p:cNvPr>
-          <p:cNvSpPr/>
-          <p:nvPr/>
-        </p:nvSpPr>
-        <p:spPr>
-          <a:xfrm>
-            <a:off x="6019955" y="1061760"/>
-            <a:ext cx="3251863" cy="1784050"/>
-          </a:xfrm>
-          <a:prstGeom prst="rect">
-            <a:avLst/>
-          </a:prstGeom>
-          <a:solidFill>
-            <a:schemeClr val="bg1">
-              <a:lumMod val="85000"/>
-            </a:schemeClr>
-          </a:solidFill>
-          <a:ln>
-            <a:noFill/>
-          </a:ln>
-        </p:spPr>
-        <p:style>
-          <a:lnRef idx="2">
-            <a:schemeClr val="accent1">
-              <a:shade val="50000"/>
-            </a:schemeClr>
-          </a:lnRef>
-          <a:fillRef idx="1">
-            <a:schemeClr val="accent1"/>
-          </a:fillRef>
-          <a:effectRef idx="0">
-            <a:schemeClr val="accent1"/>
-          </a:effectRef>
-          <a:fontRef idx="minor">
-            <a:schemeClr val="lt1"/>
-          </a:fontRef>
-        </p:style>
-        <p:txBody>
-          <a:bodyPr rtlCol="0" anchor="ctr"/>
-          <a:lstStyle/>
-          <a:p>
-            <a:pPr algn="ctr"/>
-            <a:endParaRPr lang="en-US"/>
-          </a:p>
-        </p:txBody>
-      </p:sp>
-      <p:sp>
-        <p:nvSpPr>
-          <p:cNvPr id="36" name="Rectangle 35">
-            <a:extLst>
-              <a:ext uri="{FF2B5EF4-FFF2-40B4-BE49-F238E27FC236}">
-                <a16:creationId xmlns="" xmlns:a16="http://schemas.microsoft.com/office/drawing/2014/main" id="{5F4A4132-62A0-4359-A556-90169DF61140}"/>
-              </a:ext>
-            </a:extLst>
-          </p:cNvPr>
-          <p:cNvSpPr/>
-          <p:nvPr/>
-        </p:nvSpPr>
-        <p:spPr>
-          <a:xfrm>
-            <a:off x="6354226" y="1520514"/>
-            <a:ext cx="589707" cy="548265"/>
-          </a:xfrm>
-          <a:prstGeom prst="rect">
-            <a:avLst/>
-          </a:prstGeom>
-          <a:noFill/>
-          <a:ln>
-            <a:solidFill>
-              <a:schemeClr val="tx1"/>
-            </a:solidFill>
-          </a:ln>
-        </p:spPr>
-        <p:style>
-          <a:lnRef idx="2">
-            <a:schemeClr val="accent1">
-              <a:shade val="50000"/>
-            </a:schemeClr>
-          </a:lnRef>
-          <a:fillRef idx="1">
-            <a:schemeClr val="accent1"/>
-          </a:fillRef>
-          <a:effectRef idx="0">
-            <a:schemeClr val="accent1"/>
-          </a:effectRef>
-          <a:fontRef idx="minor">
-            <a:schemeClr val="lt1"/>
-          </a:fontRef>
-        </p:style>
-        <p:txBody>
-          <a:bodyPr rtlCol="0" anchor="ctr"/>
-          <a:lstStyle/>
-          <a:p>
-            <a:pPr algn="ctr"/>
-            <a:endParaRPr lang="en-US"/>
-          </a:p>
-        </p:txBody>
-      </p:sp>
-      <p:sp>
-        <p:nvSpPr>
-          <p:cNvPr id="37" name="Rectangle 36">
-            <a:extLst>
-              <a:ext uri="{FF2B5EF4-FFF2-40B4-BE49-F238E27FC236}">
-                <a16:creationId xmlns="" xmlns:a16="http://schemas.microsoft.com/office/drawing/2014/main" id="{4B101870-D617-4B38-8C70-2394252B3323}"/>
-              </a:ext>
-            </a:extLst>
-          </p:cNvPr>
-          <p:cNvSpPr/>
-          <p:nvPr/>
-        </p:nvSpPr>
-        <p:spPr>
-          <a:xfrm>
-            <a:off x="5994628" y="2085562"/>
-            <a:ext cx="1313180" cy="646331"/>
-          </a:xfrm>
-          <a:prstGeom prst="rect">
-            <a:avLst/>
-          </a:prstGeom>
-        </p:spPr>
-        <p:txBody>
-          <a:bodyPr wrap="none">
-            <a:spAutoFit/>
-          </a:bodyPr>
-          <a:lstStyle/>
-          <a:p>
-            <a:pPr algn="ctr"/>
-            <a:r>
-              <a:rPr lang="sv-SE" dirty="0">
-                <a:latin typeface="Arial" panose="020B0604020202020204" pitchFamily="34" charset="0"/>
-                <a:cs typeface="Arial" panose="020B0604020202020204" pitchFamily="34" charset="0"/>
-              </a:rPr>
-              <a:t>Basic</a:t>
-            </a:r>
-          </a:p>
-          <a:p>
-            <a:pPr algn="ctr"/>
-            <a:r>
-              <a:rPr lang="sv-SE" dirty="0" err="1">
-                <a:latin typeface="Arial" panose="020B0604020202020204" pitchFamily="34" charset="0"/>
-                <a:cs typeface="Arial" panose="020B0604020202020204" pitchFamily="34" charset="0"/>
-              </a:rPr>
-              <a:t>Leader</a:t>
-            </a:r>
-            <a:r>
-              <a:rPr lang="sv-SE" dirty="0">
-                <a:latin typeface="Arial" panose="020B0604020202020204" pitchFamily="34" charset="0"/>
-                <a:cs typeface="Arial" panose="020B0604020202020204" pitchFamily="34" charset="0"/>
-              </a:rPr>
-              <a:t> Bot</a:t>
-            </a:r>
-            <a:endParaRPr lang="en-US" dirty="0"/>
-          </a:p>
-        </p:txBody>
-      </p:sp>
-      <p:sp>
-        <p:nvSpPr>
-          <p:cNvPr id="38" name="Rectangle 37">
-            <a:extLst>
-              <a:ext uri="{FF2B5EF4-FFF2-40B4-BE49-F238E27FC236}">
-                <a16:creationId xmlns="" xmlns:a16="http://schemas.microsoft.com/office/drawing/2014/main" id="{C917C82C-58B7-4AA7-A94D-98D12F824498}"/>
-              </a:ext>
-            </a:extLst>
-          </p:cNvPr>
-          <p:cNvSpPr/>
-          <p:nvPr/>
-        </p:nvSpPr>
-        <p:spPr>
-          <a:xfrm>
-            <a:off x="6362998" y="1159288"/>
-            <a:ext cx="569387" cy="369332"/>
-          </a:xfrm>
-          <a:prstGeom prst="rect">
-            <a:avLst/>
-          </a:prstGeom>
-        </p:spPr>
-        <p:txBody>
-          <a:bodyPr wrap="none">
-            <a:spAutoFit/>
-          </a:bodyPr>
-          <a:lstStyle/>
-          <a:p>
-            <a:r>
-              <a:rPr lang="sv-SE" dirty="0">
-                <a:latin typeface="Arial" panose="020B0604020202020204" pitchFamily="34" charset="0"/>
-                <a:cs typeface="Arial" panose="020B0604020202020204" pitchFamily="34" charset="0"/>
-              </a:rPr>
-              <a:t>€20</a:t>
-            </a:r>
-            <a:endParaRPr lang="en-US" dirty="0"/>
-          </a:p>
-        </p:txBody>
-      </p:sp>
-      <p:sp>
-        <p:nvSpPr>
-          <p:cNvPr id="41" name="Rectangle 40">
-            <a:extLst>
-              <a:ext uri="{FF2B5EF4-FFF2-40B4-BE49-F238E27FC236}">
-                <a16:creationId xmlns="" xmlns:a16="http://schemas.microsoft.com/office/drawing/2014/main" id="{C96D5A3A-401E-4360-A926-9ADE459BBEF2}"/>
-              </a:ext>
-            </a:extLst>
-          </p:cNvPr>
-          <p:cNvSpPr/>
-          <p:nvPr/>
-        </p:nvSpPr>
-        <p:spPr>
-          <a:xfrm>
-            <a:off x="7203903" y="2085562"/>
-            <a:ext cx="1223412" cy="646331"/>
-          </a:xfrm>
-          <a:prstGeom prst="rect">
-            <a:avLst/>
-          </a:prstGeom>
-        </p:spPr>
-        <p:txBody>
-          <a:bodyPr wrap="none">
-            <a:spAutoFit/>
-          </a:bodyPr>
-          <a:lstStyle/>
-          <a:p>
-            <a:pPr algn="ctr"/>
-            <a:r>
-              <a:rPr lang="sv-SE" dirty="0">
-                <a:latin typeface="Arial" panose="020B0604020202020204" pitchFamily="34" charset="0"/>
-                <a:cs typeface="Arial" panose="020B0604020202020204" pitchFamily="34" charset="0"/>
-              </a:rPr>
-              <a:t>Basic</a:t>
-            </a:r>
-          </a:p>
-          <a:p>
-            <a:pPr algn="ctr"/>
-            <a:r>
-              <a:rPr lang="sv-SE" dirty="0" err="1">
-                <a:latin typeface="Arial" panose="020B0604020202020204" pitchFamily="34" charset="0"/>
-                <a:cs typeface="Arial" panose="020B0604020202020204" pitchFamily="34" charset="0"/>
-              </a:rPr>
-              <a:t>Melee</a:t>
-            </a:r>
-            <a:r>
-              <a:rPr lang="sv-SE" dirty="0">
-                <a:latin typeface="Arial" panose="020B0604020202020204" pitchFamily="34" charset="0"/>
-                <a:cs typeface="Arial" panose="020B0604020202020204" pitchFamily="34" charset="0"/>
-              </a:rPr>
-              <a:t> Bot</a:t>
-            </a:r>
-            <a:endParaRPr lang="en-US" dirty="0"/>
-          </a:p>
-        </p:txBody>
-      </p:sp>
-      <p:sp>
-        <p:nvSpPr>
-          <p:cNvPr id="42" name="Rectangle 41">
-            <a:extLst>
-              <a:ext uri="{FF2B5EF4-FFF2-40B4-BE49-F238E27FC236}">
-                <a16:creationId xmlns="" xmlns:a16="http://schemas.microsoft.com/office/drawing/2014/main" id="{2190B5B3-6D2B-4506-B8FE-FD7E6CB3E43D}"/>
-              </a:ext>
-            </a:extLst>
-          </p:cNvPr>
-          <p:cNvSpPr/>
-          <p:nvPr/>
-        </p:nvSpPr>
-        <p:spPr>
-          <a:xfrm>
-            <a:off x="7527388" y="1159288"/>
-            <a:ext cx="569387" cy="369332"/>
-          </a:xfrm>
-          <a:prstGeom prst="rect">
-            <a:avLst/>
-          </a:prstGeom>
-        </p:spPr>
-        <p:txBody>
-          <a:bodyPr wrap="none">
-            <a:spAutoFit/>
-          </a:bodyPr>
-          <a:lstStyle/>
-          <a:p>
-            <a:r>
-              <a:rPr lang="sv-SE" dirty="0">
-                <a:latin typeface="Arial" panose="020B0604020202020204" pitchFamily="34" charset="0"/>
-                <a:cs typeface="Arial" panose="020B0604020202020204" pitchFamily="34" charset="0"/>
-              </a:rPr>
-              <a:t>€15</a:t>
-            </a:r>
-            <a:endParaRPr lang="en-US" dirty="0"/>
-          </a:p>
-        </p:txBody>
-      </p:sp>
-      <p:sp>
-        <p:nvSpPr>
-          <p:cNvPr id="43" name="Oval 42">
-            <a:extLst>
-              <a:ext uri="{FF2B5EF4-FFF2-40B4-BE49-F238E27FC236}">
-                <a16:creationId xmlns="" xmlns:a16="http://schemas.microsoft.com/office/drawing/2014/main" id="{4D266B7E-018C-46ED-8D35-52F9E5B7E141}"/>
-              </a:ext>
-            </a:extLst>
-          </p:cNvPr>
-          <p:cNvSpPr/>
-          <p:nvPr/>
-        </p:nvSpPr>
-        <p:spPr>
-          <a:xfrm>
-            <a:off x="7507636" y="1514589"/>
-            <a:ext cx="608889" cy="595981"/>
-          </a:xfrm>
-          <a:prstGeom prst="ellipse">
-            <a:avLst/>
-          </a:prstGeom>
-          <a:noFill/>
-          <a:ln>
-            <a:solidFill>
-              <a:schemeClr val="tx1"/>
-            </a:solidFill>
-          </a:ln>
-        </p:spPr>
-        <p:style>
-          <a:lnRef idx="2">
-            <a:schemeClr val="accent1">
-              <a:shade val="50000"/>
-            </a:schemeClr>
-          </a:lnRef>
-          <a:fillRef idx="1">
-            <a:schemeClr val="accent1"/>
-          </a:fillRef>
-          <a:effectRef idx="0">
-            <a:schemeClr val="accent1"/>
-          </a:effectRef>
-          <a:fontRef idx="minor">
-            <a:schemeClr val="lt1"/>
-          </a:fontRef>
-        </p:style>
-        <p:txBody>
-          <a:bodyPr rtlCol="0" anchor="ctr"/>
-          <a:lstStyle/>
-          <a:p>
-            <a:pPr algn="ctr"/>
-            <a:endParaRPr lang="en-US"/>
-          </a:p>
-        </p:txBody>
-      </p:sp>
-      <p:sp>
-        <p:nvSpPr>
-          <p:cNvPr id="44" name="Rectangle 43">
-            <a:extLst>
-              <a:ext uri="{FF2B5EF4-FFF2-40B4-BE49-F238E27FC236}">
-                <a16:creationId xmlns="" xmlns:a16="http://schemas.microsoft.com/office/drawing/2014/main" id="{7EE4F98B-E7AC-475C-9644-7DFFA759FB0B}"/>
-              </a:ext>
-            </a:extLst>
-          </p:cNvPr>
-          <p:cNvSpPr/>
-          <p:nvPr/>
-        </p:nvSpPr>
-        <p:spPr>
-          <a:xfrm>
-            <a:off x="8370000" y="2084158"/>
-            <a:ext cx="748923" cy="646331"/>
-          </a:xfrm>
-          <a:prstGeom prst="rect">
-            <a:avLst/>
-          </a:prstGeom>
-        </p:spPr>
-        <p:txBody>
-          <a:bodyPr wrap="none">
-            <a:spAutoFit/>
-          </a:bodyPr>
-          <a:lstStyle/>
-          <a:p>
-            <a:pPr algn="ctr"/>
-            <a:r>
-              <a:rPr lang="sv-SE" dirty="0">
-                <a:latin typeface="Arial" panose="020B0604020202020204" pitchFamily="34" charset="0"/>
-                <a:cs typeface="Arial" panose="020B0604020202020204" pitchFamily="34" charset="0"/>
-              </a:rPr>
-              <a:t>Basic</a:t>
-            </a:r>
-          </a:p>
-          <a:p>
-            <a:pPr algn="ctr"/>
-            <a:r>
-              <a:rPr lang="sv-SE" dirty="0" err="1">
-                <a:latin typeface="Arial" panose="020B0604020202020204" pitchFamily="34" charset="0"/>
-                <a:cs typeface="Arial" panose="020B0604020202020204" pitchFamily="34" charset="0"/>
-              </a:rPr>
-              <a:t>Droid</a:t>
-            </a:r>
-            <a:endParaRPr lang="en-US" dirty="0"/>
-          </a:p>
-        </p:txBody>
-      </p:sp>
-      <p:sp>
-        <p:nvSpPr>
-          <p:cNvPr id="45" name="Rectangle 44">
-            <a:extLst>
-              <a:ext uri="{FF2B5EF4-FFF2-40B4-BE49-F238E27FC236}">
-                <a16:creationId xmlns="" xmlns:a16="http://schemas.microsoft.com/office/drawing/2014/main" id="{3317DF71-E5C0-4D1B-9FF7-14D271D9E7DA}"/>
-              </a:ext>
-            </a:extLst>
-          </p:cNvPr>
-          <p:cNvSpPr/>
-          <p:nvPr/>
-        </p:nvSpPr>
-        <p:spPr>
-          <a:xfrm>
-            <a:off x="8456242" y="1167716"/>
-            <a:ext cx="569387" cy="369332"/>
-          </a:xfrm>
-          <a:prstGeom prst="rect">
-            <a:avLst/>
-          </a:prstGeom>
-        </p:spPr>
-        <p:txBody>
-          <a:bodyPr wrap="none">
-            <a:spAutoFit/>
-          </a:bodyPr>
-          <a:lstStyle/>
-          <a:p>
-            <a:r>
-              <a:rPr lang="sv-SE" dirty="0">
-                <a:latin typeface="Arial" panose="020B0604020202020204" pitchFamily="34" charset="0"/>
-                <a:cs typeface="Arial" panose="020B0604020202020204" pitchFamily="34" charset="0"/>
-              </a:rPr>
-              <a:t>€10</a:t>
-            </a:r>
-            <a:endParaRPr lang="en-US" dirty="0"/>
-          </a:p>
-        </p:txBody>
-      </p:sp>
-      <p:sp>
-        <p:nvSpPr>
-          <p:cNvPr id="47" name="Isosceles Triangle 46">
-            <a:extLst>
-              <a:ext uri="{FF2B5EF4-FFF2-40B4-BE49-F238E27FC236}">
-                <a16:creationId xmlns="" xmlns:a16="http://schemas.microsoft.com/office/drawing/2014/main" id="{365D57FF-0831-4183-8DC8-946B7A8F2BC8}"/>
-              </a:ext>
-            </a:extLst>
-          </p:cNvPr>
-          <p:cNvSpPr/>
-          <p:nvPr/>
-        </p:nvSpPr>
-        <p:spPr>
-          <a:xfrm>
-            <a:off x="8428556" y="1520187"/>
-            <a:ext cx="660938" cy="584783"/>
-          </a:xfrm>
-          <a:prstGeom prst="triangle">
-            <a:avLst/>
-          </a:prstGeom>
-          <a:noFill/>
-          <a:ln>
-            <a:solidFill>
-              <a:schemeClr val="tx1"/>
-            </a:solidFill>
-          </a:ln>
-        </p:spPr>
-        <p:style>
-          <a:lnRef idx="2">
-            <a:schemeClr val="accent1">
-              <a:shade val="50000"/>
-            </a:schemeClr>
-          </a:lnRef>
-          <a:fillRef idx="1">
-            <a:schemeClr val="accent1"/>
-          </a:fillRef>
-          <a:effectRef idx="0">
-            <a:schemeClr val="accent1"/>
-          </a:effectRef>
-          <a:fontRef idx="minor">
-            <a:schemeClr val="lt1"/>
-          </a:fontRef>
-        </p:style>
-        <p:txBody>
-          <a:bodyPr rtlCol="0" anchor="ctr"/>
-          <a:lstStyle/>
-          <a:p>
-            <a:pPr algn="ctr"/>
-            <a:endParaRPr lang="en-US"/>
-          </a:p>
-        </p:txBody>
-      </p:sp>
-      <p:sp>
-        <p:nvSpPr>
-          <p:cNvPr id="48" name="Rectangle 47">
-            <a:extLst>
-              <a:ext uri="{FF2B5EF4-FFF2-40B4-BE49-F238E27FC236}">
-                <a16:creationId xmlns="" xmlns:a16="http://schemas.microsoft.com/office/drawing/2014/main" id="{F5359955-D619-4358-950D-11FFC7F3CF9F}"/>
-              </a:ext>
-            </a:extLst>
-          </p:cNvPr>
-          <p:cNvSpPr/>
-          <p:nvPr/>
-        </p:nvSpPr>
-        <p:spPr>
-          <a:xfrm>
-            <a:off x="8469079" y="4150535"/>
-            <a:ext cx="589707" cy="548265"/>
-          </a:xfrm>
-          <a:prstGeom prst="rect">
-            <a:avLst/>
-          </a:prstGeom>
-          <a:noFill/>
-          <a:ln>
-            <a:solidFill>
-              <a:schemeClr val="tx1"/>
-            </a:solidFill>
-          </a:ln>
-        </p:spPr>
-        <p:style>
-          <a:lnRef idx="2">
-            <a:schemeClr val="accent1">
-              <a:shade val="50000"/>
-            </a:schemeClr>
-          </a:lnRef>
-          <a:fillRef idx="1">
-            <a:schemeClr val="accent1"/>
-          </a:fillRef>
-          <a:effectRef idx="0">
-            <a:schemeClr val="accent1"/>
-          </a:effectRef>
-          <a:fontRef idx="minor">
-            <a:schemeClr val="lt1"/>
-          </a:fontRef>
-        </p:style>
-        <p:txBody>
-          <a:bodyPr rtlCol="0" anchor="ctr"/>
-          <a:lstStyle/>
-          <a:p>
-            <a:pPr algn="ctr"/>
-            <a:endParaRPr lang="en-US"/>
-          </a:p>
-        </p:txBody>
-      </p:sp>
-      <p:sp>
-        <p:nvSpPr>
-          <p:cNvPr id="49" name="Oval 48">
-            <a:extLst>
-              <a:ext uri="{FF2B5EF4-FFF2-40B4-BE49-F238E27FC236}">
-                <a16:creationId xmlns="" xmlns:a16="http://schemas.microsoft.com/office/drawing/2014/main" id="{C897382F-DB40-4D09-A46F-D78D8100EC22}"/>
-              </a:ext>
-            </a:extLst>
-          </p:cNvPr>
-          <p:cNvSpPr/>
-          <p:nvPr/>
-        </p:nvSpPr>
-        <p:spPr>
-          <a:xfrm>
-            <a:off x="8459487" y="4890689"/>
-            <a:ext cx="608889" cy="595981"/>
-          </a:xfrm>
-          <a:prstGeom prst="ellipse">
-            <a:avLst/>
-          </a:prstGeom>
-          <a:noFill/>
-          <a:ln>
-            <a:solidFill>
-              <a:schemeClr val="tx1"/>
-            </a:solidFill>
-          </a:ln>
-        </p:spPr>
-        <p:style>
-          <a:lnRef idx="2">
-            <a:schemeClr val="accent1">
-              <a:shade val="50000"/>
-            </a:schemeClr>
-          </a:lnRef>
-          <a:fillRef idx="1">
-            <a:schemeClr val="accent1"/>
-          </a:fillRef>
-          <a:effectRef idx="0">
-            <a:schemeClr val="accent1"/>
-          </a:effectRef>
-          <a:fontRef idx="minor">
-            <a:schemeClr val="lt1"/>
-          </a:fontRef>
-        </p:style>
-        <p:txBody>
-          <a:bodyPr rtlCol="0" anchor="ctr"/>
-          <a:lstStyle/>
-          <a:p>
-            <a:pPr algn="ctr"/>
-            <a:endParaRPr lang="en-US"/>
-          </a:p>
-        </p:txBody>
-      </p:sp>
-      <p:sp>
-        <p:nvSpPr>
-          <p:cNvPr id="50" name="Isosceles Triangle 49">
-            <a:extLst>
-              <a:ext uri="{FF2B5EF4-FFF2-40B4-BE49-F238E27FC236}">
-                <a16:creationId xmlns="" xmlns:a16="http://schemas.microsoft.com/office/drawing/2014/main" id="{A701C5C9-AEA9-4193-9E85-0AB493C0BE10}"/>
-              </a:ext>
-            </a:extLst>
-          </p:cNvPr>
-          <p:cNvSpPr/>
-          <p:nvPr/>
-        </p:nvSpPr>
-        <p:spPr>
-          <a:xfrm>
-            <a:off x="8433424" y="5678559"/>
-            <a:ext cx="660938" cy="584783"/>
-          </a:xfrm>
-          <a:prstGeom prst="triangle">
-            <a:avLst/>
-          </a:prstGeom>
-          <a:noFill/>
-          <a:ln>
-            <a:solidFill>
-              <a:schemeClr val="tx1"/>
-            </a:solidFill>
-          </a:ln>
-        </p:spPr>
-        <p:style>
-          <a:lnRef idx="2">
-            <a:schemeClr val="accent1">
-              <a:shade val="50000"/>
-            </a:schemeClr>
-          </a:lnRef>
-          <a:fillRef idx="1">
-            <a:schemeClr val="accent1"/>
-          </a:fillRef>
-          <a:effectRef idx="0">
-            <a:schemeClr val="accent1"/>
-          </a:effectRef>
-          <a:fontRef idx="minor">
-            <a:schemeClr val="lt1"/>
-          </a:fontRef>
-        </p:style>
-        <p:txBody>
-          <a:bodyPr rtlCol="0" anchor="ctr"/>
-          <a:lstStyle/>
-          <a:p>
-            <a:pPr algn="ctr"/>
-            <a:endParaRPr lang="en-US"/>
-          </a:p>
-        </p:txBody>
-      </p:sp>
-      <p:sp>
-        <p:nvSpPr>
-          <p:cNvPr id="51" name="Rectangle 50">
-            <a:extLst>
-              <a:ext uri="{FF2B5EF4-FFF2-40B4-BE49-F238E27FC236}">
-                <a16:creationId xmlns="" xmlns:a16="http://schemas.microsoft.com/office/drawing/2014/main" id="{0E76F026-2452-4896-A572-F7CE53C174A2}"/>
-              </a:ext>
-            </a:extLst>
-          </p:cNvPr>
-          <p:cNvSpPr/>
-          <p:nvPr/>
-        </p:nvSpPr>
-        <p:spPr>
-          <a:xfrm>
-            <a:off x="9148720" y="4236196"/>
-            <a:ext cx="1492716" cy="369332"/>
-          </a:xfrm>
-          <a:prstGeom prst="rect">
-            <a:avLst/>
-          </a:prstGeom>
-        </p:spPr>
-        <p:txBody>
-          <a:bodyPr wrap="none">
-            <a:spAutoFit/>
-          </a:bodyPr>
-          <a:lstStyle/>
-          <a:p>
-            <a:r>
-              <a:rPr lang="sv-SE" dirty="0" err="1">
-                <a:latin typeface="Arial" panose="020B0604020202020204" pitchFamily="34" charset="0"/>
-                <a:cs typeface="Arial" panose="020B0604020202020204" pitchFamily="34" charset="0"/>
-              </a:rPr>
-              <a:t>Leader</a:t>
-            </a:r>
-            <a:r>
-              <a:rPr lang="sv-SE" dirty="0">
-                <a:latin typeface="Arial" panose="020B0604020202020204" pitchFamily="34" charset="0"/>
-                <a:cs typeface="Arial" panose="020B0604020202020204" pitchFamily="34" charset="0"/>
-              </a:rPr>
-              <a:t> robot</a:t>
-            </a:r>
-            <a:endParaRPr lang="en-US" dirty="0"/>
-          </a:p>
-        </p:txBody>
-      </p:sp>
-      <p:sp>
-        <p:nvSpPr>
-          <p:cNvPr id="53" name="Rectangle 52">
-            <a:extLst>
-              <a:ext uri="{FF2B5EF4-FFF2-40B4-BE49-F238E27FC236}">
-                <a16:creationId xmlns="" xmlns:a16="http://schemas.microsoft.com/office/drawing/2014/main" id="{D5448F18-C362-4F8D-BDE9-67585A9F1232}"/>
-              </a:ext>
-            </a:extLst>
-          </p:cNvPr>
-          <p:cNvSpPr/>
-          <p:nvPr/>
-        </p:nvSpPr>
-        <p:spPr>
-          <a:xfrm>
-            <a:off x="9149184" y="5004013"/>
-            <a:ext cx="1518364" cy="369332"/>
-          </a:xfrm>
-          <a:prstGeom prst="rect">
-            <a:avLst/>
-          </a:prstGeom>
-        </p:spPr>
-        <p:txBody>
-          <a:bodyPr wrap="none">
-            <a:spAutoFit/>
-          </a:bodyPr>
-          <a:lstStyle/>
-          <a:p>
-            <a:r>
-              <a:rPr lang="sv-SE" dirty="0" smtClean="0">
-                <a:latin typeface="Arial" panose="020B0604020202020204" pitchFamily="34" charset="0"/>
-                <a:cs typeface="Arial" panose="020B0604020202020204" pitchFamily="34" charset="0"/>
-              </a:rPr>
-              <a:t>Normal robot</a:t>
-            </a:r>
-            <a:endParaRPr lang="en-US" dirty="0"/>
-          </a:p>
-        </p:txBody>
-      </p:sp>
-      <p:sp>
-        <p:nvSpPr>
-          <p:cNvPr id="54" name="Rectangle 53">
-            <a:extLst>
-              <a:ext uri="{FF2B5EF4-FFF2-40B4-BE49-F238E27FC236}">
-                <a16:creationId xmlns="" xmlns:a16="http://schemas.microsoft.com/office/drawing/2014/main" id="{CCB4F67D-B10C-40C9-BD04-30237B979029}"/>
-              </a:ext>
-            </a:extLst>
-          </p:cNvPr>
-          <p:cNvSpPr/>
-          <p:nvPr/>
-        </p:nvSpPr>
-        <p:spPr>
-          <a:xfrm>
-            <a:off x="9142524" y="5786284"/>
-            <a:ext cx="736099" cy="369332"/>
-          </a:xfrm>
-          <a:prstGeom prst="rect">
-            <a:avLst/>
-          </a:prstGeom>
-        </p:spPr>
-        <p:txBody>
-          <a:bodyPr wrap="none">
-            <a:spAutoFit/>
-          </a:bodyPr>
-          <a:lstStyle/>
-          <a:p>
-            <a:r>
-              <a:rPr lang="sv-SE" dirty="0" err="1">
-                <a:latin typeface="Arial" panose="020B0604020202020204" pitchFamily="34" charset="0"/>
-                <a:cs typeface="Arial" panose="020B0604020202020204" pitchFamily="34" charset="0"/>
-              </a:rPr>
-              <a:t>Droid</a:t>
-            </a:r>
-            <a:endParaRPr lang="en-US" dirty="0"/>
-          </a:p>
-        </p:txBody>
-      </p:sp>
-      <p:sp>
-        <p:nvSpPr>
-          <p:cNvPr id="55" name="Rectangle 54">
-            <a:extLst>
-              <a:ext uri="{FF2B5EF4-FFF2-40B4-BE49-F238E27FC236}">
-                <a16:creationId xmlns="" xmlns:a16="http://schemas.microsoft.com/office/drawing/2014/main" id="{9BE72583-89CE-4A5E-BE1B-80DC1EEDC4BD}"/>
-              </a:ext>
-            </a:extLst>
-          </p:cNvPr>
-          <p:cNvSpPr/>
-          <p:nvPr/>
-        </p:nvSpPr>
-        <p:spPr>
-          <a:xfrm>
-            <a:off x="8298406" y="4014138"/>
-            <a:ext cx="2369142" cy="2399071"/>
-          </a:xfrm>
-          <a:prstGeom prst="rect">
-            <a:avLst/>
-          </a:prstGeom>
-          <a:noFill/>
-          <a:ln w="38100">
-            <a:solidFill>
-              <a:schemeClr val="tx1"/>
-            </a:solidFill>
-          </a:ln>
-        </p:spPr>
-        <p:style>
-          <a:lnRef idx="2">
-            <a:schemeClr val="accent1">
-              <a:shade val="50000"/>
-            </a:schemeClr>
-          </a:lnRef>
-          <a:fillRef idx="1">
-            <a:schemeClr val="accent1"/>
-          </a:fillRef>
-          <a:effectRef idx="0">
-            <a:schemeClr val="accent1"/>
-          </a:effectRef>
-          <a:fontRef idx="minor">
-            <a:schemeClr val="lt1"/>
-          </a:fontRef>
-        </p:style>
-        <p:txBody>
-          <a:bodyPr rtlCol="0" anchor="ctr"/>
-          <a:lstStyle/>
-          <a:p>
-            <a:pPr algn="ctr"/>
-            <a:endParaRPr lang="en-US"/>
-          </a:p>
-        </p:txBody>
-      </p:sp>
-      <p:sp>
-        <p:nvSpPr>
-          <p:cNvPr id="58" name="Rectangle 57">
-            <a:extLst>
-              <a:ext uri="{FF2B5EF4-FFF2-40B4-BE49-F238E27FC236}">
-                <a16:creationId xmlns="" xmlns:a16="http://schemas.microsoft.com/office/drawing/2014/main" id="{008A882D-E05D-4360-9FE0-EAC6BFDC9DC1}"/>
-              </a:ext>
-            </a:extLst>
-          </p:cNvPr>
-          <p:cNvSpPr/>
-          <p:nvPr/>
-        </p:nvSpPr>
-        <p:spPr>
-          <a:xfrm>
-            <a:off x="4317861" y="5282278"/>
-            <a:ext cx="1338828" cy="923330"/>
-          </a:xfrm>
-          <a:prstGeom prst="rect">
-            <a:avLst/>
-          </a:prstGeom>
-        </p:spPr>
-        <p:txBody>
-          <a:bodyPr wrap="none">
-            <a:spAutoFit/>
-          </a:bodyPr>
-          <a:lstStyle/>
-          <a:p>
-            <a:r>
-              <a:rPr lang="sv-SE" dirty="0">
-                <a:latin typeface="Arial" panose="020B0604020202020204" pitchFamily="34" charset="0"/>
-                <a:cs typeface="Arial" panose="020B0604020202020204" pitchFamily="34" charset="0"/>
-              </a:rPr>
-              <a:t>Robot D</a:t>
-            </a:r>
-          </a:p>
-          <a:p>
-            <a:r>
-              <a:rPr lang="sv-SE" dirty="0">
-                <a:latin typeface="Arial" panose="020B0604020202020204" pitchFamily="34" charset="0"/>
-                <a:cs typeface="Arial" panose="020B0604020202020204" pitchFamily="34" charset="0"/>
-              </a:rPr>
-              <a:t>2x Robot B</a:t>
-            </a:r>
-          </a:p>
-          <a:p>
-            <a:pPr algn="r"/>
-            <a:r>
-              <a:rPr lang="sv-SE" dirty="0">
-                <a:latin typeface="Arial" panose="020B0604020202020204" pitchFamily="34" charset="0"/>
-                <a:cs typeface="Arial" panose="020B0604020202020204" pitchFamily="34" charset="0"/>
-              </a:rPr>
-              <a:t>= €</a:t>
-            </a:r>
-            <a:r>
-              <a:rPr lang="sv-SE" dirty="0" smtClean="0">
-                <a:latin typeface="Arial" panose="020B0604020202020204" pitchFamily="34" charset="0"/>
-                <a:cs typeface="Arial" panose="020B0604020202020204" pitchFamily="34" charset="0"/>
-              </a:rPr>
-              <a:t>93</a:t>
-            </a:r>
-            <a:endParaRPr lang="en-US" dirty="0"/>
-          </a:p>
-        </p:txBody>
-      </p:sp>
-      <p:sp>
-        <p:nvSpPr>
-          <p:cNvPr id="59" name="Rectangle 58">
-            <a:extLst>
-              <a:ext uri="{FF2B5EF4-FFF2-40B4-BE49-F238E27FC236}">
-                <a16:creationId xmlns="" xmlns:a16="http://schemas.microsoft.com/office/drawing/2014/main" id="{056EDE35-63CE-478C-8ED2-7E7F75128045}"/>
-              </a:ext>
-            </a:extLst>
-          </p:cNvPr>
-          <p:cNvSpPr/>
-          <p:nvPr/>
-        </p:nvSpPr>
-        <p:spPr>
-          <a:xfrm>
-            <a:off x="6119822" y="4831274"/>
-            <a:ext cx="1959191" cy="1200329"/>
-          </a:xfrm>
-          <a:prstGeom prst="rect">
-            <a:avLst/>
-          </a:prstGeom>
-        </p:spPr>
-        <p:txBody>
-          <a:bodyPr wrap="none">
-            <a:spAutoFit/>
-          </a:bodyPr>
-          <a:lstStyle/>
-          <a:p>
-            <a:r>
-              <a:rPr lang="sv-SE" dirty="0">
-                <a:latin typeface="Arial" panose="020B0604020202020204" pitchFamily="34" charset="0"/>
-                <a:cs typeface="Arial" panose="020B0604020202020204" pitchFamily="34" charset="0"/>
-              </a:rPr>
-              <a:t>Basic </a:t>
-            </a:r>
-            <a:r>
-              <a:rPr lang="sv-SE" dirty="0" err="1">
-                <a:latin typeface="Arial" panose="020B0604020202020204" pitchFamily="34" charset="0"/>
-                <a:cs typeface="Arial" panose="020B0604020202020204" pitchFamily="34" charset="0"/>
-              </a:rPr>
-              <a:t>Leader</a:t>
-            </a:r>
-            <a:r>
-              <a:rPr lang="sv-SE" dirty="0">
-                <a:latin typeface="Arial" panose="020B0604020202020204" pitchFamily="34" charset="0"/>
-                <a:cs typeface="Arial" panose="020B0604020202020204" pitchFamily="34" charset="0"/>
-              </a:rPr>
-              <a:t> Bot</a:t>
-            </a:r>
-          </a:p>
-          <a:p>
-            <a:r>
-              <a:rPr lang="sv-SE" dirty="0">
-                <a:latin typeface="Arial" panose="020B0604020202020204" pitchFamily="34" charset="0"/>
-                <a:cs typeface="Arial" panose="020B0604020202020204" pitchFamily="34" charset="0"/>
-              </a:rPr>
-              <a:t>3x Robot B</a:t>
-            </a:r>
-          </a:p>
-          <a:p>
-            <a:r>
-              <a:rPr lang="sv-SE" dirty="0">
-                <a:latin typeface="Arial" panose="020B0604020202020204" pitchFamily="34" charset="0"/>
-                <a:cs typeface="Arial" panose="020B0604020202020204" pitchFamily="34" charset="0"/>
-              </a:rPr>
-              <a:t>Basic </a:t>
-            </a:r>
-            <a:r>
-              <a:rPr lang="sv-SE" dirty="0" err="1">
-                <a:latin typeface="Arial" panose="020B0604020202020204" pitchFamily="34" charset="0"/>
-                <a:cs typeface="Arial" panose="020B0604020202020204" pitchFamily="34" charset="0"/>
-              </a:rPr>
-              <a:t>Melee</a:t>
-            </a:r>
-            <a:r>
-              <a:rPr lang="sv-SE" dirty="0">
-                <a:latin typeface="Arial" panose="020B0604020202020204" pitchFamily="34" charset="0"/>
-                <a:cs typeface="Arial" panose="020B0604020202020204" pitchFamily="34" charset="0"/>
-              </a:rPr>
-              <a:t> Bot</a:t>
-            </a:r>
-          </a:p>
-          <a:p>
-            <a:pPr algn="r"/>
-            <a:r>
-              <a:rPr lang="sv-SE" dirty="0">
-                <a:latin typeface="Arial" panose="020B0604020202020204" pitchFamily="34" charset="0"/>
-                <a:cs typeface="Arial" panose="020B0604020202020204" pitchFamily="34" charset="0"/>
-              </a:rPr>
-              <a:t>= €</a:t>
-            </a:r>
-            <a:r>
-              <a:rPr lang="sv-SE" dirty="0" smtClean="0">
-                <a:latin typeface="Arial" panose="020B0604020202020204" pitchFamily="34" charset="0"/>
-                <a:cs typeface="Arial" panose="020B0604020202020204" pitchFamily="34" charset="0"/>
-              </a:rPr>
-              <a:t>93</a:t>
-            </a:r>
-            <a:endParaRPr lang="en-US" dirty="0"/>
-          </a:p>
-        </p:txBody>
-      </p:sp>
-      <p:sp>
-        <p:nvSpPr>
-          <p:cNvPr id="61" name="Rectangle 60">
-            <a:extLst>
-              <a:ext uri="{FF2B5EF4-FFF2-40B4-BE49-F238E27FC236}">
-                <a16:creationId xmlns="" xmlns:a16="http://schemas.microsoft.com/office/drawing/2014/main" id="{2555CB7B-E89E-4FAA-90C1-77E7EDE66192}"/>
-              </a:ext>
-            </a:extLst>
-          </p:cNvPr>
-          <p:cNvSpPr/>
-          <p:nvPr/>
-        </p:nvSpPr>
-        <p:spPr>
-          <a:xfrm>
-            <a:off x="5133824" y="3671436"/>
-            <a:ext cx="428322" cy="369332"/>
-          </a:xfrm>
-          <a:prstGeom prst="rect">
-            <a:avLst/>
-          </a:prstGeom>
-        </p:spPr>
-        <p:txBody>
-          <a:bodyPr wrap="none">
-            <a:spAutoFit/>
-          </a:bodyPr>
-          <a:lstStyle/>
-          <a:p>
-            <a:r>
-              <a:rPr lang="sv-SE" dirty="0">
-                <a:latin typeface="Arial" panose="020B0604020202020204" pitchFamily="34" charset="0"/>
-                <a:cs typeface="Arial" panose="020B0604020202020204" pitchFamily="34" charset="0"/>
-              </a:rPr>
-              <a:t>2x</a:t>
-            </a:r>
-            <a:endParaRPr lang="en-US" dirty="0"/>
-          </a:p>
-        </p:txBody>
-      </p:sp>
-      <p:cxnSp>
-        <p:nvCxnSpPr>
-          <p:cNvPr id="62" name="Straight Arrow Connector 61">
-            <a:extLst>
-              <a:ext uri="{FF2B5EF4-FFF2-40B4-BE49-F238E27FC236}">
-                <a16:creationId xmlns="" xmlns:a16="http://schemas.microsoft.com/office/drawing/2014/main" id="{CD0D2D9E-BF44-4F05-8A34-7D366C108330}"/>
-              </a:ext>
-            </a:extLst>
-          </p:cNvPr>
-          <p:cNvCxnSpPr>
-            <a:cxnSpLocks/>
-            <a:stCxn id="21" idx="0"/>
-          </p:cNvCxnSpPr>
-          <p:nvPr/>
-        </p:nvCxnSpPr>
-        <p:spPr>
-          <a:xfrm flipV="1">
-            <a:off x="6628344" y="2736078"/>
-            <a:ext cx="145195" cy="1816140"/>
-          </a:xfrm>
-          <a:prstGeom prst="straightConnector1">
-            <a:avLst/>
-          </a:prstGeom>
-          <a:ln w="38100">
-            <a:solidFill>
-              <a:schemeClr val="tx1"/>
-            </a:solidFill>
-            <a:prstDash val="dash"/>
-            <a:tailEnd type="triangle"/>
-          </a:ln>
-        </p:spPr>
-        <p:style>
-          <a:lnRef idx="1">
-            <a:schemeClr val="accent1"/>
-          </a:lnRef>
-          <a:fillRef idx="0">
-            <a:schemeClr val="accent1"/>
-          </a:fillRef>
-          <a:effectRef idx="0">
-            <a:schemeClr val="accent1"/>
-          </a:effectRef>
-          <a:fontRef idx="minor">
-            <a:schemeClr val="tx1"/>
-          </a:fontRef>
-        </p:style>
-      </p:cxnSp>
-      <p:cxnSp>
-        <p:nvCxnSpPr>
-          <p:cNvPr id="65" name="Straight Arrow Connector 64">
-            <a:extLst>
-              <a:ext uri="{FF2B5EF4-FFF2-40B4-BE49-F238E27FC236}">
-                <a16:creationId xmlns="" xmlns:a16="http://schemas.microsoft.com/office/drawing/2014/main" id="{246C7C9F-0B2A-4180-BBF3-91835824417D}"/>
-              </a:ext>
-            </a:extLst>
-          </p:cNvPr>
-          <p:cNvCxnSpPr>
-            <a:cxnSpLocks/>
-          </p:cNvCxnSpPr>
-          <p:nvPr/>
-        </p:nvCxnSpPr>
-        <p:spPr>
-          <a:xfrm flipV="1">
-            <a:off x="6749323" y="2722061"/>
-            <a:ext cx="951463" cy="1780321"/>
-          </a:xfrm>
-          <a:prstGeom prst="straightConnector1">
-            <a:avLst/>
-          </a:prstGeom>
-          <a:ln w="38100">
-            <a:solidFill>
-              <a:schemeClr val="tx1"/>
-            </a:solidFill>
-            <a:prstDash val="dash"/>
-            <a:tailEnd type="triangle"/>
-          </a:ln>
-        </p:spPr>
-        <p:style>
-          <a:lnRef idx="1">
-            <a:schemeClr val="accent1"/>
-          </a:lnRef>
-          <a:fillRef idx="0">
-            <a:schemeClr val="accent1"/>
-          </a:fillRef>
-          <a:effectRef idx="0">
-            <a:schemeClr val="accent1"/>
-          </a:effectRef>
-          <a:fontRef idx="minor">
-            <a:schemeClr val="tx1"/>
-          </a:fontRef>
-        </p:style>
-      </p:cxnSp>
-      <p:sp>
-        <p:nvSpPr>
-          <p:cNvPr id="69" name="Rectangle 68">
-            <a:extLst>
-              <a:ext uri="{FF2B5EF4-FFF2-40B4-BE49-F238E27FC236}">
-                <a16:creationId xmlns="" xmlns:a16="http://schemas.microsoft.com/office/drawing/2014/main" id="{C83A164E-C563-4661-88E8-6ECF4A2EFD91}"/>
-              </a:ext>
-            </a:extLst>
-          </p:cNvPr>
-          <p:cNvSpPr/>
-          <p:nvPr/>
-        </p:nvSpPr>
-        <p:spPr>
-          <a:xfrm>
-            <a:off x="565666" y="5096491"/>
-            <a:ext cx="2807278" cy="1316718"/>
-          </a:xfrm>
-          <a:prstGeom prst="rect">
-            <a:avLst/>
-          </a:prstGeom>
-          <a:noFill/>
-          <a:ln w="38100">
-            <a:solidFill>
-              <a:schemeClr val="tx1"/>
-            </a:solidFill>
-          </a:ln>
-        </p:spPr>
-        <p:style>
-          <a:lnRef idx="2">
-            <a:schemeClr val="accent1">
-              <a:shade val="50000"/>
-            </a:schemeClr>
-          </a:lnRef>
-          <a:fillRef idx="1">
-            <a:schemeClr val="accent1"/>
-          </a:fillRef>
-          <a:effectRef idx="0">
-            <a:schemeClr val="accent1"/>
-          </a:effectRef>
-          <a:fontRef idx="minor">
-            <a:schemeClr val="lt1"/>
-          </a:fontRef>
-        </p:style>
-        <p:txBody>
-          <a:bodyPr rtlCol="0" anchor="ctr"/>
-          <a:lstStyle/>
-          <a:p>
-            <a:pPr algn="ctr"/>
-            <a:endParaRPr lang="en-US"/>
-          </a:p>
-        </p:txBody>
-      </p:sp>
-      <p:sp>
-        <p:nvSpPr>
-          <p:cNvPr id="70" name="Rectangle 69">
-            <a:extLst>
-              <a:ext uri="{FF2B5EF4-FFF2-40B4-BE49-F238E27FC236}">
-                <a16:creationId xmlns="" xmlns:a16="http://schemas.microsoft.com/office/drawing/2014/main" id="{63126789-69EB-4A05-B3F1-9FBBE1870485}"/>
-              </a:ext>
-            </a:extLst>
-          </p:cNvPr>
-          <p:cNvSpPr/>
-          <p:nvPr/>
-        </p:nvSpPr>
-        <p:spPr>
-          <a:xfrm>
-            <a:off x="8775091" y="3557278"/>
-            <a:ext cx="1415772" cy="369332"/>
-          </a:xfrm>
-          <a:prstGeom prst="rect">
-            <a:avLst/>
-          </a:prstGeom>
-        </p:spPr>
-        <p:txBody>
-          <a:bodyPr wrap="none">
-            <a:spAutoFit/>
-          </a:bodyPr>
-          <a:lstStyle/>
-          <a:p>
-            <a:pPr algn="ctr"/>
-            <a:r>
-              <a:rPr lang="sv-SE" dirty="0">
-                <a:latin typeface="Arial" panose="020B0604020202020204" pitchFamily="34" charset="0"/>
-                <a:cs typeface="Arial" panose="020B0604020202020204" pitchFamily="34" charset="0"/>
-              </a:rPr>
-              <a:t>Robot </a:t>
-            </a:r>
-            <a:r>
-              <a:rPr lang="sv-SE" dirty="0" err="1">
-                <a:latin typeface="Arial" panose="020B0604020202020204" pitchFamily="34" charset="0"/>
-                <a:cs typeface="Arial" panose="020B0604020202020204" pitchFamily="34" charset="0"/>
-              </a:rPr>
-              <a:t>types</a:t>
-            </a:r>
-            <a:endParaRPr lang="en-US" dirty="0"/>
-          </a:p>
-        </p:txBody>
-      </p:sp>
-      <p:sp>
-        <p:nvSpPr>
-          <p:cNvPr id="71" name="Rectangle 70">
-            <a:extLst>
-              <a:ext uri="{FF2B5EF4-FFF2-40B4-BE49-F238E27FC236}">
-                <a16:creationId xmlns="" xmlns:a16="http://schemas.microsoft.com/office/drawing/2014/main" id="{344B0749-0CB8-4421-876A-8DFE0A980333}"/>
-              </a:ext>
-            </a:extLst>
-          </p:cNvPr>
-          <p:cNvSpPr/>
-          <p:nvPr/>
-        </p:nvSpPr>
-        <p:spPr>
-          <a:xfrm>
-            <a:off x="940818" y="4665644"/>
-            <a:ext cx="2056973" cy="369332"/>
-          </a:xfrm>
-          <a:prstGeom prst="rect">
-            <a:avLst/>
-          </a:prstGeom>
-        </p:spPr>
-        <p:txBody>
-          <a:bodyPr wrap="none">
-            <a:spAutoFit/>
-          </a:bodyPr>
-          <a:lstStyle/>
-          <a:p>
-            <a:pPr algn="ctr"/>
-            <a:r>
-              <a:rPr lang="sv-SE" dirty="0">
-                <a:latin typeface="Arial" panose="020B0604020202020204" pitchFamily="34" charset="0"/>
-                <a:cs typeface="Arial" panose="020B0604020202020204" pitchFamily="34" charset="0"/>
-              </a:rPr>
-              <a:t>Business relations</a:t>
-            </a:r>
-            <a:endParaRPr lang="en-US" dirty="0"/>
-          </a:p>
-        </p:txBody>
-      </p:sp>
-      <p:cxnSp>
-        <p:nvCxnSpPr>
-          <p:cNvPr id="72" name="Straight Arrow Connector 71">
-            <a:extLst>
-              <a:ext uri="{FF2B5EF4-FFF2-40B4-BE49-F238E27FC236}">
-                <a16:creationId xmlns="" xmlns:a16="http://schemas.microsoft.com/office/drawing/2014/main" id="{ED92BC3B-9A65-49BB-A725-60214763FBDC}"/>
-              </a:ext>
-            </a:extLst>
-          </p:cNvPr>
-          <p:cNvCxnSpPr>
-            <a:cxnSpLocks/>
-          </p:cNvCxnSpPr>
-          <p:nvPr/>
-        </p:nvCxnSpPr>
-        <p:spPr>
-          <a:xfrm>
-            <a:off x="777313" y="5467099"/>
-            <a:ext cx="767826" cy="0"/>
-          </a:xfrm>
-          <a:prstGeom prst="straightConnector1">
-            <a:avLst/>
-          </a:prstGeom>
-          <a:ln w="38100">
-            <a:solidFill>
-              <a:schemeClr val="tx1"/>
-            </a:solidFill>
-            <a:tailEnd type="triangle"/>
-          </a:ln>
-        </p:spPr>
-        <p:style>
-          <a:lnRef idx="1">
-            <a:schemeClr val="accent1"/>
-          </a:lnRef>
-          <a:fillRef idx="0">
-            <a:schemeClr val="accent1"/>
-          </a:fillRef>
-          <a:effectRef idx="0">
-            <a:schemeClr val="accent1"/>
-          </a:effectRef>
-          <a:fontRef idx="minor">
-            <a:schemeClr val="tx1"/>
-          </a:fontRef>
-        </p:style>
-      </p:cxnSp>
-      <p:cxnSp>
-        <p:nvCxnSpPr>
-          <p:cNvPr id="75" name="Straight Arrow Connector 74">
-            <a:extLst>
-              <a:ext uri="{FF2B5EF4-FFF2-40B4-BE49-F238E27FC236}">
-                <a16:creationId xmlns="" xmlns:a16="http://schemas.microsoft.com/office/drawing/2014/main" id="{2077B21C-FF58-4DD2-A484-CB04AB2993AE}"/>
-              </a:ext>
-            </a:extLst>
-          </p:cNvPr>
-          <p:cNvCxnSpPr>
-            <a:cxnSpLocks/>
-          </p:cNvCxnSpPr>
-          <p:nvPr/>
-        </p:nvCxnSpPr>
-        <p:spPr>
-          <a:xfrm flipH="1" flipV="1">
-            <a:off x="3071167" y="3282847"/>
-            <a:ext cx="3195504" cy="1288394"/>
-          </a:xfrm>
-          <a:prstGeom prst="straightConnector1">
-            <a:avLst/>
-          </a:prstGeom>
-          <a:ln w="38100">
-            <a:solidFill>
-              <a:schemeClr val="tx1"/>
-            </a:solidFill>
-            <a:tailEnd type="triangle"/>
-          </a:ln>
-        </p:spPr>
-        <p:style>
-          <a:lnRef idx="1">
-            <a:schemeClr val="accent1"/>
-          </a:lnRef>
-          <a:fillRef idx="0">
-            <a:schemeClr val="accent1"/>
-          </a:fillRef>
-          <a:effectRef idx="0">
-            <a:schemeClr val="accent1"/>
-          </a:effectRef>
-          <a:fontRef idx="minor">
-            <a:schemeClr val="tx1"/>
-          </a:fontRef>
-        </p:style>
-      </p:cxnSp>
-      <p:sp>
-        <p:nvSpPr>
-          <p:cNvPr id="77" name="Rectangle 76">
-            <a:extLst>
-              <a:ext uri="{FF2B5EF4-FFF2-40B4-BE49-F238E27FC236}">
-                <a16:creationId xmlns="" xmlns:a16="http://schemas.microsoft.com/office/drawing/2014/main" id="{B88EADB8-1203-446F-A495-2DCA82F847EF}"/>
-              </a:ext>
-            </a:extLst>
-          </p:cNvPr>
-          <p:cNvSpPr/>
-          <p:nvPr/>
-        </p:nvSpPr>
-        <p:spPr>
-          <a:xfrm>
-            <a:off x="1626330" y="5274371"/>
-            <a:ext cx="1082348" cy="369332"/>
-          </a:xfrm>
-          <a:prstGeom prst="rect">
-            <a:avLst/>
-          </a:prstGeom>
-        </p:spPr>
-        <p:txBody>
-          <a:bodyPr wrap="none">
-            <a:spAutoFit/>
-          </a:bodyPr>
-          <a:lstStyle/>
-          <a:p>
-            <a:r>
-              <a:rPr lang="sv-SE" dirty="0" err="1">
-                <a:latin typeface="Arial" panose="020B0604020202020204" pitchFamily="34" charset="0"/>
-                <a:cs typeface="Arial" panose="020B0604020202020204" pitchFamily="34" charset="0"/>
-              </a:rPr>
-              <a:t>Bespoke</a:t>
-            </a:r>
-            <a:endParaRPr lang="en-US" dirty="0"/>
-          </a:p>
-        </p:txBody>
-      </p:sp>
-      <p:cxnSp>
-        <p:nvCxnSpPr>
-          <p:cNvPr id="78" name="Straight Arrow Connector 77">
-            <a:extLst>
-              <a:ext uri="{FF2B5EF4-FFF2-40B4-BE49-F238E27FC236}">
-                <a16:creationId xmlns="" xmlns:a16="http://schemas.microsoft.com/office/drawing/2014/main" id="{396437B9-EEFB-4A03-B933-1CDFB1C8BC64}"/>
-              </a:ext>
-            </a:extLst>
-          </p:cNvPr>
-          <p:cNvCxnSpPr>
-            <a:cxnSpLocks/>
-          </p:cNvCxnSpPr>
-          <p:nvPr/>
-        </p:nvCxnSpPr>
-        <p:spPr>
-          <a:xfrm>
-            <a:off x="777313" y="6031334"/>
-            <a:ext cx="767826" cy="0"/>
-          </a:xfrm>
-          <a:prstGeom prst="straightConnector1">
-            <a:avLst/>
-          </a:prstGeom>
-          <a:ln w="38100">
-            <a:solidFill>
-              <a:schemeClr val="tx1"/>
-            </a:solidFill>
-            <a:prstDash val="dash"/>
-            <a:tailEnd type="triangle"/>
-          </a:ln>
-        </p:spPr>
-        <p:style>
-          <a:lnRef idx="1">
-            <a:schemeClr val="accent1"/>
-          </a:lnRef>
-          <a:fillRef idx="0">
-            <a:schemeClr val="accent1"/>
-          </a:fillRef>
-          <a:effectRef idx="0">
-            <a:schemeClr val="accent1"/>
-          </a:effectRef>
-          <a:fontRef idx="minor">
-            <a:schemeClr val="tx1"/>
-          </a:fontRef>
-        </p:style>
-      </p:cxnSp>
-      <p:sp>
-        <p:nvSpPr>
-          <p:cNvPr id="79" name="Rectangle 78">
-            <a:extLst>
-              <a:ext uri="{FF2B5EF4-FFF2-40B4-BE49-F238E27FC236}">
-                <a16:creationId xmlns="" xmlns:a16="http://schemas.microsoft.com/office/drawing/2014/main" id="{48CD2476-701A-4C45-9F84-14B0B78541D7}"/>
-              </a:ext>
-            </a:extLst>
-          </p:cNvPr>
-          <p:cNvSpPr/>
-          <p:nvPr/>
-        </p:nvSpPr>
-        <p:spPr>
-          <a:xfrm>
-            <a:off x="1638459" y="5846668"/>
-            <a:ext cx="1518364" cy="369332"/>
-          </a:xfrm>
-          <a:prstGeom prst="rect">
-            <a:avLst/>
-          </a:prstGeom>
-        </p:spPr>
-        <p:txBody>
-          <a:bodyPr wrap="none">
-            <a:spAutoFit/>
-          </a:bodyPr>
-          <a:lstStyle/>
-          <a:p>
-            <a:r>
-              <a:rPr lang="sv-SE" dirty="0" err="1">
-                <a:latin typeface="Arial" panose="020B0604020202020204" pitchFamily="34" charset="0"/>
-                <a:cs typeface="Arial" panose="020B0604020202020204" pitchFamily="34" charset="0"/>
-              </a:rPr>
-              <a:t>Open</a:t>
-            </a:r>
-            <a:r>
-              <a:rPr lang="sv-SE" dirty="0">
-                <a:latin typeface="Arial" panose="020B0604020202020204" pitchFamily="34" charset="0"/>
-                <a:cs typeface="Arial" panose="020B0604020202020204" pitchFamily="34" charset="0"/>
-              </a:rPr>
-              <a:t> market</a:t>
-            </a:r>
-            <a:endParaRPr lang="en-US" dirty="0"/>
-          </a:p>
-        </p:txBody>
-      </p:sp>
-    </p:spTree>
-    <p:extLst>
-      <p:ext uri="{BB962C8B-B14F-4D97-AF65-F5344CB8AC3E}">
-        <p14:creationId xmlns:p14="http://schemas.microsoft.com/office/powerpoint/2010/main" val="3343880895"/>
-      </p:ext>
-    </p:extLst>
-  </p:cSld>
-  <p:clrMapOvr>
-    <a:masterClrMapping/>
-  </p:clrMapOvr>
-</p:sld>
-</file>
-
-<file path=ppt/slides/slide5.xml><?xml version="1.0" encoding="utf-8"?>
 <p:sld xmlns:a="http://schemas.openxmlformats.org/drawingml/2006/main" xmlns:r="http://schemas.openxmlformats.org/officeDocument/2006/relationships" xmlns:p="http://schemas.openxmlformats.org/presentationml/2006/main">
   <p:cSld>
     <p:spTree>
@@ -36539,7 +33889,7 @@
 </p:sld>
 </file>
 
-<file path=ppt/slides/slide6.xml><?xml version="1.0" encoding="utf-8"?>
+<file path=ppt/slides/slide5.xml><?xml version="1.0" encoding="utf-8"?>
 <p:sld xmlns:a="http://schemas.openxmlformats.org/drawingml/2006/main" xmlns:r="http://schemas.openxmlformats.org/officeDocument/2006/relationships" xmlns:p="http://schemas.openxmlformats.org/presentationml/2006/main">
   <p:cSld>
     <p:spTree>
@@ -39030,7 +36380,7 @@
 </p:sld>
 </file>
 
-<file path=ppt/slides/slide7.xml><?xml version="1.0" encoding="utf-8"?>
+<file path=ppt/slides/slide6.xml><?xml version="1.0" encoding="utf-8"?>
 <p:sld xmlns:a="http://schemas.openxmlformats.org/drawingml/2006/main" xmlns:r="http://schemas.openxmlformats.org/officeDocument/2006/relationships" xmlns:p="http://schemas.openxmlformats.org/presentationml/2006/main">
   <p:cSld>
     <p:spTree>
@@ -41332,7 +38682,7 @@
 </p:sld>
 </file>
 
-<file path=ppt/slides/slide8.xml><?xml version="1.0" encoding="utf-8"?>
+<file path=ppt/slides/slide7.xml><?xml version="1.0" encoding="utf-8"?>
 <p:sld xmlns:a="http://schemas.openxmlformats.org/drawingml/2006/main" xmlns:r="http://schemas.openxmlformats.org/officeDocument/2006/relationships" xmlns:p="http://schemas.openxmlformats.org/presentationml/2006/main">
   <p:cSld>
     <p:spTree>
@@ -43652,7 +41002,7 @@
 </p:sld>
 </file>
 
-<file path=ppt/slides/slide9.xml><?xml version="1.0" encoding="utf-8"?>
+<file path=ppt/slides/slide8.xml><?xml version="1.0" encoding="utf-8"?>
 <p:sld xmlns:a="http://schemas.openxmlformats.org/drawingml/2006/main" xmlns:r="http://schemas.openxmlformats.org/officeDocument/2006/relationships" xmlns:p="http://schemas.openxmlformats.org/presentationml/2006/main">
   <p:cSld>
     <p:spTree>
@@ -43946,6 +41296,303 @@
     <p:extLst>
       <p:ext uri="{BB962C8B-B14F-4D97-AF65-F5344CB8AC3E}">
         <p14:creationId xmlns:p14="http://schemas.microsoft.com/office/powerpoint/2010/main" val="2004659444"/>
+      </p:ext>
+    </p:extLst>
+  </p:cSld>
+  <p:clrMapOvr>
+    <a:masterClrMapping/>
+  </p:clrMapOvr>
+</p:sld>
+</file>
+
+<file path=ppt/slides/slide9.xml><?xml version="1.0" encoding="utf-8"?>
+<p:sld xmlns:a="http://schemas.openxmlformats.org/drawingml/2006/main" xmlns:r="http://schemas.openxmlformats.org/officeDocument/2006/relationships" xmlns:p="http://schemas.openxmlformats.org/presentationml/2006/main">
+  <p:cSld>
+    <p:spTree>
+      <p:nvGrpSpPr>
+        <p:cNvPr id="1" name=""/>
+        <p:cNvGrpSpPr/>
+        <p:nvPr/>
+      </p:nvGrpSpPr>
+      <p:grpSpPr>
+        <a:xfrm>
+          <a:off x="0" y="0"/>
+          <a:ext cx="0" cy="0"/>
+          <a:chOff x="0" y="0"/>
+          <a:chExt cx="0" cy="0"/>
+        </a:xfrm>
+      </p:grpSpPr>
+      <p:sp>
+        <p:nvSpPr>
+          <p:cNvPr id="5" name="Oval 4">
+            <a:extLst>
+              <a:ext uri="{FF2B5EF4-FFF2-40B4-BE49-F238E27FC236}">
+                <a16:creationId xmlns="" xmlns:a16="http://schemas.microsoft.com/office/drawing/2014/main" id="{1BE905D4-A72F-472F-85B9-E5262CB9A9BA}"/>
+              </a:ext>
+            </a:extLst>
+          </p:cNvPr>
+          <p:cNvSpPr/>
+          <p:nvPr/>
+        </p:nvSpPr>
+        <p:spPr>
+          <a:xfrm>
+            <a:off x="2923413" y="717756"/>
+            <a:ext cx="3598606" cy="3429000"/>
+          </a:xfrm>
+          <a:prstGeom prst="ellipse">
+            <a:avLst/>
+          </a:prstGeom>
+          <a:noFill/>
+          <a:ln w="38100">
+            <a:noFill/>
+          </a:ln>
+        </p:spPr>
+        <p:style>
+          <a:lnRef idx="2">
+            <a:schemeClr val="accent1">
+              <a:shade val="50000"/>
+            </a:schemeClr>
+          </a:lnRef>
+          <a:fillRef idx="1">
+            <a:schemeClr val="accent1"/>
+          </a:fillRef>
+          <a:effectRef idx="0">
+            <a:schemeClr val="accent1"/>
+          </a:effectRef>
+          <a:fontRef idx="minor">
+            <a:schemeClr val="lt1"/>
+          </a:fontRef>
+        </p:style>
+        <p:txBody>
+          <a:bodyPr rtlCol="0" anchor="ctr"/>
+          <a:lstStyle/>
+          <a:p>
+            <a:pPr algn="ctr"/>
+            <a:endParaRPr lang="en-US"/>
+          </a:p>
+        </p:txBody>
+      </p:sp>
+      <p:sp>
+        <p:nvSpPr>
+          <p:cNvPr id="6" name="Oval 5">
+            <a:extLst>
+              <a:ext uri="{FF2B5EF4-FFF2-40B4-BE49-F238E27FC236}">
+                <a16:creationId xmlns="" xmlns:a16="http://schemas.microsoft.com/office/drawing/2014/main" id="{DA8FA223-F814-41D8-8A8C-99F6794FF949}"/>
+              </a:ext>
+            </a:extLst>
+          </p:cNvPr>
+          <p:cNvSpPr/>
+          <p:nvPr/>
+        </p:nvSpPr>
+        <p:spPr>
+          <a:xfrm>
+            <a:off x="4301613" y="3092246"/>
+            <a:ext cx="3598606" cy="3429000"/>
+          </a:xfrm>
+          <a:prstGeom prst="ellipse">
+            <a:avLst/>
+          </a:prstGeom>
+          <a:noFill/>
+          <a:ln w="38100">
+            <a:noFill/>
+          </a:ln>
+        </p:spPr>
+        <p:style>
+          <a:lnRef idx="2">
+            <a:schemeClr val="accent1">
+              <a:shade val="50000"/>
+            </a:schemeClr>
+          </a:lnRef>
+          <a:fillRef idx="1">
+            <a:schemeClr val="accent1"/>
+          </a:fillRef>
+          <a:effectRef idx="0">
+            <a:schemeClr val="accent1"/>
+          </a:effectRef>
+          <a:fontRef idx="minor">
+            <a:schemeClr val="lt1"/>
+          </a:fontRef>
+        </p:style>
+        <p:txBody>
+          <a:bodyPr rtlCol="0" anchor="ctr"/>
+          <a:lstStyle/>
+          <a:p>
+            <a:pPr algn="ctr"/>
+            <a:endParaRPr lang="en-US"/>
+          </a:p>
+        </p:txBody>
+      </p:sp>
+      <p:sp>
+        <p:nvSpPr>
+          <p:cNvPr id="7" name="Oval 6">
+            <a:extLst>
+              <a:ext uri="{FF2B5EF4-FFF2-40B4-BE49-F238E27FC236}">
+                <a16:creationId xmlns="" xmlns:a16="http://schemas.microsoft.com/office/drawing/2014/main" id="{2C06C390-1650-43A9-92CD-878AF82A2EDE}"/>
+              </a:ext>
+            </a:extLst>
+          </p:cNvPr>
+          <p:cNvSpPr/>
+          <p:nvPr/>
+        </p:nvSpPr>
+        <p:spPr>
+          <a:xfrm>
+            <a:off x="5656779" y="717756"/>
+            <a:ext cx="3598606" cy="3429000"/>
+          </a:xfrm>
+          <a:prstGeom prst="ellipse">
+            <a:avLst/>
+          </a:prstGeom>
+          <a:noFill/>
+          <a:ln w="38100">
+            <a:noFill/>
+          </a:ln>
+        </p:spPr>
+        <p:style>
+          <a:lnRef idx="2">
+            <a:schemeClr val="accent1">
+              <a:shade val="50000"/>
+            </a:schemeClr>
+          </a:lnRef>
+          <a:fillRef idx="1">
+            <a:schemeClr val="accent1"/>
+          </a:fillRef>
+          <a:effectRef idx="0">
+            <a:schemeClr val="accent1"/>
+          </a:effectRef>
+          <a:fontRef idx="minor">
+            <a:schemeClr val="lt1"/>
+          </a:fontRef>
+        </p:style>
+        <p:txBody>
+          <a:bodyPr rtlCol="0" anchor="ctr"/>
+          <a:lstStyle/>
+          <a:p>
+            <a:pPr algn="ctr"/>
+            <a:endParaRPr lang="en-US"/>
+          </a:p>
+        </p:txBody>
+      </p:sp>
+      <p:sp>
+        <p:nvSpPr>
+          <p:cNvPr id="8" name="Rectangle 7">
+            <a:extLst>
+              <a:ext uri="{FF2B5EF4-FFF2-40B4-BE49-F238E27FC236}">
+                <a16:creationId xmlns="" xmlns:a16="http://schemas.microsoft.com/office/drawing/2014/main" id="{42BB545C-B9B2-4B88-A085-D7573212A8A6}"/>
+              </a:ext>
+            </a:extLst>
+          </p:cNvPr>
+          <p:cNvSpPr/>
+          <p:nvPr/>
+        </p:nvSpPr>
+        <p:spPr>
+          <a:xfrm>
+            <a:off x="6914421" y="1909036"/>
+            <a:ext cx="1925528" cy="523220"/>
+          </a:xfrm>
+          <a:prstGeom prst="rect">
+            <a:avLst/>
+          </a:prstGeom>
+        </p:spPr>
+        <p:txBody>
+          <a:bodyPr wrap="none">
+            <a:spAutoFit/>
+          </a:bodyPr>
+          <a:lstStyle/>
+          <a:p>
+            <a:pPr algn="ctr"/>
+            <a:r>
+              <a:rPr lang="sv-SE" sz="2800" dirty="0" err="1">
+                <a:latin typeface="Arial" panose="020B0604020202020204" pitchFamily="34" charset="0"/>
+                <a:cs typeface="Arial" panose="020B0604020202020204" pitchFamily="34" charset="0"/>
+              </a:rPr>
+              <a:t>Monetizing</a:t>
+            </a:r>
+            <a:endParaRPr lang="en-US" dirty="0"/>
+          </a:p>
+        </p:txBody>
+      </p:sp>
+      <p:sp>
+        <p:nvSpPr>
+          <p:cNvPr id="9" name="Rectangle 8">
+            <a:extLst>
+              <a:ext uri="{FF2B5EF4-FFF2-40B4-BE49-F238E27FC236}">
+                <a16:creationId xmlns="" xmlns:a16="http://schemas.microsoft.com/office/drawing/2014/main" id="{822A8BCF-BF7A-45F3-AEB2-2A8B87E5DD2B}"/>
+              </a:ext>
+            </a:extLst>
+          </p:cNvPr>
+          <p:cNvSpPr/>
+          <p:nvPr/>
+        </p:nvSpPr>
+        <p:spPr>
+          <a:xfrm>
+            <a:off x="3225245" y="1909036"/>
+            <a:ext cx="2106667" cy="523220"/>
+          </a:xfrm>
+          <a:prstGeom prst="rect">
+            <a:avLst/>
+          </a:prstGeom>
+        </p:spPr>
+        <p:txBody>
+          <a:bodyPr wrap="none">
+            <a:spAutoFit/>
+          </a:bodyPr>
+          <a:lstStyle/>
+          <a:p>
+            <a:pPr algn="ctr"/>
+            <a:r>
+              <a:rPr lang="sv-SE" sz="2800" dirty="0">
+                <a:latin typeface="Arial" panose="020B0604020202020204" pitchFamily="34" charset="0"/>
+                <a:cs typeface="Arial" panose="020B0604020202020204" pitchFamily="34" charset="0"/>
+              </a:rPr>
+              <a:t>Engineering</a:t>
+            </a:r>
+            <a:endParaRPr lang="en-US" dirty="0"/>
+          </a:p>
+        </p:txBody>
+      </p:sp>
+      <p:sp>
+        <p:nvSpPr>
+          <p:cNvPr id="10" name="Rectangle 9">
+            <a:extLst>
+              <a:ext uri="{FF2B5EF4-FFF2-40B4-BE49-F238E27FC236}">
+                <a16:creationId xmlns="" xmlns:a16="http://schemas.microsoft.com/office/drawing/2014/main" id="{37CDA193-5920-4DBA-9F62-8C8CE4AE6FFB}"/>
+              </a:ext>
+            </a:extLst>
+          </p:cNvPr>
+          <p:cNvSpPr/>
+          <p:nvPr/>
+        </p:nvSpPr>
+        <p:spPr>
+          <a:xfrm>
+            <a:off x="5083383" y="4716587"/>
+            <a:ext cx="2084225" cy="523220"/>
+          </a:xfrm>
+          <a:prstGeom prst="rect">
+            <a:avLst/>
+          </a:prstGeom>
+        </p:spPr>
+        <p:txBody>
+          <a:bodyPr wrap="none">
+            <a:spAutoFit/>
+          </a:bodyPr>
+          <a:lstStyle/>
+          <a:p>
+            <a:pPr algn="ctr"/>
+            <a:r>
+              <a:rPr lang="sv-SE" sz="2800" dirty="0" err="1">
+                <a:latin typeface="Arial" panose="020B0604020202020204" pitchFamily="34" charset="0"/>
+                <a:cs typeface="Arial" panose="020B0604020202020204" pitchFamily="34" charset="0"/>
+              </a:rPr>
+              <a:t>Strategizing</a:t>
+            </a:r>
+            <a:endParaRPr lang="en-US" dirty="0"/>
+          </a:p>
+        </p:txBody>
+      </p:sp>
+    </p:spTree>
+    <p:extLst>
+      <p:ext uri="{BB962C8B-B14F-4D97-AF65-F5344CB8AC3E}">
+        <p14:creationId xmlns:p14="http://schemas.microsoft.com/office/powerpoint/2010/main" val="314093017"/>
       </p:ext>
     </p:extLst>
   </p:cSld>

</xml_diff>